<commit_message>
updated pptx with assignments
</commit_message>
<xml_diff>
--- a/Planning/Project2 Mockup.pptx
+++ b/Planning/Project2 Mockup.pptx
@@ -5,7 +5,7 @@
     <p:sldMasterId id="2147483648" r:id="rId1"/>
   </p:sldMasterIdLst>
   <p:notesMasterIdLst>
-    <p:notesMasterId r:id="rId7"/>
+    <p:notesMasterId r:id="rId10"/>
   </p:notesMasterIdLst>
   <p:sldIdLst>
     <p:sldId id="256" r:id="rId2"/>
@@ -13,6 +13,9 @@
     <p:sldId id="258" r:id="rId4"/>
     <p:sldId id="259" r:id="rId5"/>
     <p:sldId id="260" r:id="rId6"/>
+    <p:sldId id="262" r:id="rId7"/>
+    <p:sldId id="263" r:id="rId8"/>
+    <p:sldId id="264" r:id="rId9"/>
   </p:sldIdLst>
   <p:sldSz cx="12192000" cy="6858000"/>
   <p:notesSz cx="9144000" cy="6858000"/>
@@ -1144,6 +1147,2745 @@
 </cs:chartStyle>
 </file>
 
+<file path=ppt/diagrams/colors1.xml><?xml version="1.0" encoding="utf-8"?>
+<dgm:colorsDef xmlns:dgm="http://schemas.openxmlformats.org/drawingml/2006/diagram" xmlns:a="http://schemas.openxmlformats.org/drawingml/2006/main" uniqueId="urn:microsoft.com/office/officeart/2005/8/colors/accent1_2">
+  <dgm:title val=""/>
+  <dgm:desc val=""/>
+  <dgm:catLst>
+    <dgm:cat type="accent1" pri="11200"/>
+  </dgm:catLst>
+  <dgm:styleLbl name="node0">
+    <dgm:fillClrLst meth="repeat">
+      <a:schemeClr val="accent1"/>
+    </dgm:fillClrLst>
+    <dgm:linClrLst meth="repeat">
+      <a:schemeClr val="lt1"/>
+    </dgm:linClrLst>
+    <dgm:effectClrLst/>
+    <dgm:txLinClrLst/>
+    <dgm:txFillClrLst/>
+    <dgm:txEffectClrLst/>
+  </dgm:styleLbl>
+  <dgm:styleLbl name="alignNode1">
+    <dgm:fillClrLst meth="repeat">
+      <a:schemeClr val="accent1"/>
+    </dgm:fillClrLst>
+    <dgm:linClrLst meth="repeat">
+      <a:schemeClr val="accent1"/>
+    </dgm:linClrLst>
+    <dgm:effectClrLst/>
+    <dgm:txLinClrLst/>
+    <dgm:txFillClrLst/>
+    <dgm:txEffectClrLst/>
+  </dgm:styleLbl>
+  <dgm:styleLbl name="node1">
+    <dgm:fillClrLst meth="repeat">
+      <a:schemeClr val="accent1"/>
+    </dgm:fillClrLst>
+    <dgm:linClrLst meth="repeat">
+      <a:schemeClr val="lt1"/>
+    </dgm:linClrLst>
+    <dgm:effectClrLst/>
+    <dgm:txLinClrLst/>
+    <dgm:txFillClrLst/>
+    <dgm:txEffectClrLst/>
+  </dgm:styleLbl>
+  <dgm:styleLbl name="lnNode1">
+    <dgm:fillClrLst meth="repeat">
+      <a:schemeClr val="accent1"/>
+    </dgm:fillClrLst>
+    <dgm:linClrLst meth="repeat">
+      <a:schemeClr val="lt1"/>
+    </dgm:linClrLst>
+    <dgm:effectClrLst/>
+    <dgm:txLinClrLst/>
+    <dgm:txFillClrLst/>
+    <dgm:txEffectClrLst/>
+  </dgm:styleLbl>
+  <dgm:styleLbl name="vennNode1">
+    <dgm:fillClrLst meth="repeat">
+      <a:schemeClr val="accent1">
+        <a:alpha val="50000"/>
+      </a:schemeClr>
+    </dgm:fillClrLst>
+    <dgm:linClrLst meth="repeat">
+      <a:schemeClr val="lt1"/>
+    </dgm:linClrLst>
+    <dgm:effectClrLst/>
+    <dgm:txLinClrLst/>
+    <dgm:txFillClrLst/>
+    <dgm:txEffectClrLst/>
+  </dgm:styleLbl>
+  <dgm:styleLbl name="node2">
+    <dgm:fillClrLst meth="repeat">
+      <a:schemeClr val="accent1"/>
+    </dgm:fillClrLst>
+    <dgm:linClrLst meth="repeat">
+      <a:schemeClr val="lt1"/>
+    </dgm:linClrLst>
+    <dgm:effectClrLst/>
+    <dgm:txLinClrLst/>
+    <dgm:txFillClrLst/>
+    <dgm:txEffectClrLst/>
+  </dgm:styleLbl>
+  <dgm:styleLbl name="node3">
+    <dgm:fillClrLst meth="repeat">
+      <a:schemeClr val="accent1"/>
+    </dgm:fillClrLst>
+    <dgm:linClrLst meth="repeat">
+      <a:schemeClr val="lt1"/>
+    </dgm:linClrLst>
+    <dgm:effectClrLst/>
+    <dgm:txLinClrLst/>
+    <dgm:txFillClrLst/>
+    <dgm:txEffectClrLst/>
+  </dgm:styleLbl>
+  <dgm:styleLbl name="node4">
+    <dgm:fillClrLst meth="repeat">
+      <a:schemeClr val="accent1"/>
+    </dgm:fillClrLst>
+    <dgm:linClrLst meth="repeat">
+      <a:schemeClr val="lt1"/>
+    </dgm:linClrLst>
+    <dgm:effectClrLst/>
+    <dgm:txLinClrLst/>
+    <dgm:txFillClrLst/>
+    <dgm:txEffectClrLst/>
+  </dgm:styleLbl>
+  <dgm:styleLbl name="fgImgPlace1">
+    <dgm:fillClrLst meth="repeat">
+      <a:schemeClr val="accent1">
+        <a:tint val="50000"/>
+      </a:schemeClr>
+    </dgm:fillClrLst>
+    <dgm:linClrLst meth="repeat">
+      <a:schemeClr val="lt1"/>
+    </dgm:linClrLst>
+    <dgm:effectClrLst/>
+    <dgm:txLinClrLst/>
+    <dgm:txFillClrLst meth="repeat">
+      <a:schemeClr val="lt1"/>
+    </dgm:txFillClrLst>
+    <dgm:txEffectClrLst/>
+  </dgm:styleLbl>
+  <dgm:styleLbl name="alignImgPlace1">
+    <dgm:fillClrLst meth="repeat">
+      <a:schemeClr val="accent1">
+        <a:tint val="50000"/>
+      </a:schemeClr>
+    </dgm:fillClrLst>
+    <dgm:linClrLst meth="repeat">
+      <a:schemeClr val="lt1"/>
+    </dgm:linClrLst>
+    <dgm:effectClrLst/>
+    <dgm:txLinClrLst/>
+    <dgm:txFillClrLst meth="repeat">
+      <a:schemeClr val="lt1"/>
+    </dgm:txFillClrLst>
+    <dgm:txEffectClrLst/>
+  </dgm:styleLbl>
+  <dgm:styleLbl name="bgImgPlace1">
+    <dgm:fillClrLst meth="repeat">
+      <a:schemeClr val="accent1">
+        <a:tint val="50000"/>
+      </a:schemeClr>
+    </dgm:fillClrLst>
+    <dgm:linClrLst meth="repeat">
+      <a:schemeClr val="lt1"/>
+    </dgm:linClrLst>
+    <dgm:effectClrLst/>
+    <dgm:txLinClrLst/>
+    <dgm:txFillClrLst meth="repeat">
+      <a:schemeClr val="lt1"/>
+    </dgm:txFillClrLst>
+    <dgm:txEffectClrLst/>
+  </dgm:styleLbl>
+  <dgm:styleLbl name="sibTrans2D1">
+    <dgm:fillClrLst meth="repeat">
+      <a:schemeClr val="accent1">
+        <a:tint val="60000"/>
+      </a:schemeClr>
+    </dgm:fillClrLst>
+    <dgm:linClrLst meth="repeat">
+      <a:schemeClr val="accent1">
+        <a:tint val="60000"/>
+      </a:schemeClr>
+    </dgm:linClrLst>
+    <dgm:effectClrLst/>
+    <dgm:txLinClrLst/>
+    <dgm:txFillClrLst/>
+    <dgm:txEffectClrLst/>
+  </dgm:styleLbl>
+  <dgm:styleLbl name="fgSibTrans2D1">
+    <dgm:fillClrLst meth="repeat">
+      <a:schemeClr val="accent1">
+        <a:tint val="60000"/>
+      </a:schemeClr>
+    </dgm:fillClrLst>
+    <dgm:linClrLst meth="repeat">
+      <a:schemeClr val="accent1">
+        <a:tint val="60000"/>
+      </a:schemeClr>
+    </dgm:linClrLst>
+    <dgm:effectClrLst/>
+    <dgm:txLinClrLst/>
+    <dgm:txFillClrLst/>
+    <dgm:txEffectClrLst/>
+  </dgm:styleLbl>
+  <dgm:styleLbl name="bgSibTrans2D1">
+    <dgm:fillClrLst meth="repeat">
+      <a:schemeClr val="accent1">
+        <a:tint val="60000"/>
+      </a:schemeClr>
+    </dgm:fillClrLst>
+    <dgm:linClrLst meth="repeat">
+      <a:schemeClr val="accent1">
+        <a:tint val="60000"/>
+      </a:schemeClr>
+    </dgm:linClrLst>
+    <dgm:effectClrLst/>
+    <dgm:txLinClrLst/>
+    <dgm:txFillClrLst/>
+    <dgm:txEffectClrLst/>
+  </dgm:styleLbl>
+  <dgm:styleLbl name="sibTrans1D1">
+    <dgm:fillClrLst meth="repeat">
+      <a:schemeClr val="accent1"/>
+    </dgm:fillClrLst>
+    <dgm:linClrLst meth="repeat">
+      <a:schemeClr val="accent1"/>
+    </dgm:linClrLst>
+    <dgm:effectClrLst/>
+    <dgm:txLinClrLst/>
+    <dgm:txFillClrLst meth="repeat">
+      <a:schemeClr val="tx1"/>
+    </dgm:txFillClrLst>
+    <dgm:txEffectClrLst/>
+  </dgm:styleLbl>
+  <dgm:styleLbl name="callout">
+    <dgm:fillClrLst meth="repeat">
+      <a:schemeClr val="accent1"/>
+    </dgm:fillClrLst>
+    <dgm:linClrLst meth="repeat">
+      <a:schemeClr val="accent1">
+        <a:tint val="50000"/>
+      </a:schemeClr>
+    </dgm:linClrLst>
+    <dgm:effectClrLst/>
+    <dgm:txLinClrLst/>
+    <dgm:txFillClrLst meth="repeat">
+      <a:schemeClr val="tx1"/>
+    </dgm:txFillClrLst>
+    <dgm:txEffectClrLst/>
+  </dgm:styleLbl>
+  <dgm:styleLbl name="asst0">
+    <dgm:fillClrLst meth="repeat">
+      <a:schemeClr val="accent1"/>
+    </dgm:fillClrLst>
+    <dgm:linClrLst meth="repeat">
+      <a:schemeClr val="lt1"/>
+    </dgm:linClrLst>
+    <dgm:effectClrLst/>
+    <dgm:txLinClrLst/>
+    <dgm:txFillClrLst/>
+    <dgm:txEffectClrLst/>
+  </dgm:styleLbl>
+  <dgm:styleLbl name="asst1">
+    <dgm:fillClrLst meth="repeat">
+      <a:schemeClr val="accent1"/>
+    </dgm:fillClrLst>
+    <dgm:linClrLst meth="repeat">
+      <a:schemeClr val="lt1"/>
+    </dgm:linClrLst>
+    <dgm:effectClrLst/>
+    <dgm:txLinClrLst/>
+    <dgm:txFillClrLst/>
+    <dgm:txEffectClrLst/>
+  </dgm:styleLbl>
+  <dgm:styleLbl name="asst2">
+    <dgm:fillClrLst meth="repeat">
+      <a:schemeClr val="accent1"/>
+    </dgm:fillClrLst>
+    <dgm:linClrLst meth="repeat">
+      <a:schemeClr val="lt1"/>
+    </dgm:linClrLst>
+    <dgm:effectClrLst/>
+    <dgm:txLinClrLst/>
+    <dgm:txFillClrLst/>
+    <dgm:txEffectClrLst/>
+  </dgm:styleLbl>
+  <dgm:styleLbl name="asst3">
+    <dgm:fillClrLst meth="repeat">
+      <a:schemeClr val="accent1"/>
+    </dgm:fillClrLst>
+    <dgm:linClrLst meth="repeat">
+      <a:schemeClr val="lt1"/>
+    </dgm:linClrLst>
+    <dgm:effectClrLst/>
+    <dgm:txLinClrLst/>
+    <dgm:txFillClrLst/>
+    <dgm:txEffectClrLst/>
+  </dgm:styleLbl>
+  <dgm:styleLbl name="asst4">
+    <dgm:fillClrLst meth="repeat">
+      <a:schemeClr val="accent1"/>
+    </dgm:fillClrLst>
+    <dgm:linClrLst meth="repeat">
+      <a:schemeClr val="lt1"/>
+    </dgm:linClrLst>
+    <dgm:effectClrLst/>
+    <dgm:txLinClrLst/>
+    <dgm:txFillClrLst/>
+    <dgm:txEffectClrLst/>
+  </dgm:styleLbl>
+  <dgm:styleLbl name="parChTrans2D1">
+    <dgm:fillClrLst meth="repeat">
+      <a:schemeClr val="accent1">
+        <a:tint val="60000"/>
+      </a:schemeClr>
+    </dgm:fillClrLst>
+    <dgm:linClrLst meth="repeat">
+      <a:schemeClr val="accent1">
+        <a:tint val="60000"/>
+      </a:schemeClr>
+    </dgm:linClrLst>
+    <dgm:effectClrLst/>
+    <dgm:txLinClrLst/>
+    <dgm:txFillClrLst meth="repeat">
+      <a:schemeClr val="lt1"/>
+    </dgm:txFillClrLst>
+    <dgm:txEffectClrLst/>
+  </dgm:styleLbl>
+  <dgm:styleLbl name="parChTrans2D2">
+    <dgm:fillClrLst meth="repeat">
+      <a:schemeClr val="accent1"/>
+    </dgm:fillClrLst>
+    <dgm:linClrLst meth="repeat">
+      <a:schemeClr val="accent1"/>
+    </dgm:linClrLst>
+    <dgm:effectClrLst/>
+    <dgm:txLinClrLst/>
+    <dgm:txFillClrLst meth="repeat">
+      <a:schemeClr val="lt1"/>
+    </dgm:txFillClrLst>
+    <dgm:txEffectClrLst/>
+  </dgm:styleLbl>
+  <dgm:styleLbl name="parChTrans2D3">
+    <dgm:fillClrLst meth="repeat">
+      <a:schemeClr val="accent1"/>
+    </dgm:fillClrLst>
+    <dgm:linClrLst meth="repeat">
+      <a:schemeClr val="accent1"/>
+    </dgm:linClrLst>
+    <dgm:effectClrLst/>
+    <dgm:txLinClrLst/>
+    <dgm:txFillClrLst meth="repeat">
+      <a:schemeClr val="lt1"/>
+    </dgm:txFillClrLst>
+    <dgm:txEffectClrLst/>
+  </dgm:styleLbl>
+  <dgm:styleLbl name="parChTrans2D4">
+    <dgm:fillClrLst meth="repeat">
+      <a:schemeClr val="accent1"/>
+    </dgm:fillClrLst>
+    <dgm:linClrLst meth="repeat">
+      <a:schemeClr val="accent1"/>
+    </dgm:linClrLst>
+    <dgm:effectClrLst/>
+    <dgm:txLinClrLst/>
+    <dgm:txFillClrLst meth="repeat">
+      <a:schemeClr val="lt1"/>
+    </dgm:txFillClrLst>
+    <dgm:txEffectClrLst/>
+  </dgm:styleLbl>
+  <dgm:styleLbl name="parChTrans1D1">
+    <dgm:fillClrLst meth="repeat">
+      <a:schemeClr val="accent1"/>
+    </dgm:fillClrLst>
+    <dgm:linClrLst meth="repeat">
+      <a:schemeClr val="accent1">
+        <a:shade val="60000"/>
+      </a:schemeClr>
+    </dgm:linClrLst>
+    <dgm:effectClrLst/>
+    <dgm:txLinClrLst/>
+    <dgm:txFillClrLst meth="repeat">
+      <a:schemeClr val="tx1"/>
+    </dgm:txFillClrLst>
+    <dgm:txEffectClrLst/>
+  </dgm:styleLbl>
+  <dgm:styleLbl name="parChTrans1D2">
+    <dgm:fillClrLst meth="repeat">
+      <a:schemeClr val="accent1"/>
+    </dgm:fillClrLst>
+    <dgm:linClrLst meth="repeat">
+      <a:schemeClr val="accent1">
+        <a:shade val="60000"/>
+      </a:schemeClr>
+    </dgm:linClrLst>
+    <dgm:effectClrLst/>
+    <dgm:txLinClrLst/>
+    <dgm:txFillClrLst meth="repeat">
+      <a:schemeClr val="tx1"/>
+    </dgm:txFillClrLst>
+    <dgm:txEffectClrLst/>
+  </dgm:styleLbl>
+  <dgm:styleLbl name="parChTrans1D3">
+    <dgm:fillClrLst meth="repeat">
+      <a:schemeClr val="accent1"/>
+    </dgm:fillClrLst>
+    <dgm:linClrLst meth="repeat">
+      <a:schemeClr val="accent1">
+        <a:shade val="80000"/>
+      </a:schemeClr>
+    </dgm:linClrLst>
+    <dgm:effectClrLst/>
+    <dgm:txLinClrLst/>
+    <dgm:txFillClrLst meth="repeat">
+      <a:schemeClr val="tx1"/>
+    </dgm:txFillClrLst>
+    <dgm:txEffectClrLst/>
+  </dgm:styleLbl>
+  <dgm:styleLbl name="parChTrans1D4">
+    <dgm:fillClrLst meth="repeat">
+      <a:schemeClr val="accent1"/>
+    </dgm:fillClrLst>
+    <dgm:linClrLst meth="repeat">
+      <a:schemeClr val="accent1">
+        <a:shade val="80000"/>
+      </a:schemeClr>
+    </dgm:linClrLst>
+    <dgm:effectClrLst/>
+    <dgm:txLinClrLst/>
+    <dgm:txFillClrLst meth="repeat">
+      <a:schemeClr val="tx1"/>
+    </dgm:txFillClrLst>
+    <dgm:txEffectClrLst/>
+  </dgm:styleLbl>
+  <dgm:styleLbl name="fgAcc1">
+    <dgm:fillClrLst meth="repeat">
+      <a:schemeClr val="lt1">
+        <a:alpha val="90000"/>
+      </a:schemeClr>
+    </dgm:fillClrLst>
+    <dgm:linClrLst meth="repeat">
+      <a:schemeClr val="accent1"/>
+    </dgm:linClrLst>
+    <dgm:effectClrLst/>
+    <dgm:txLinClrLst/>
+    <dgm:txFillClrLst meth="repeat">
+      <a:schemeClr val="dk1"/>
+    </dgm:txFillClrLst>
+    <dgm:txEffectClrLst/>
+  </dgm:styleLbl>
+  <dgm:styleLbl name="conFgAcc1">
+    <dgm:fillClrLst meth="repeat">
+      <a:schemeClr val="lt1">
+        <a:alpha val="90000"/>
+      </a:schemeClr>
+    </dgm:fillClrLst>
+    <dgm:linClrLst meth="repeat">
+      <a:schemeClr val="accent1"/>
+    </dgm:linClrLst>
+    <dgm:effectClrLst/>
+    <dgm:txLinClrLst/>
+    <dgm:txFillClrLst meth="repeat">
+      <a:schemeClr val="dk1"/>
+    </dgm:txFillClrLst>
+    <dgm:txEffectClrLst/>
+  </dgm:styleLbl>
+  <dgm:styleLbl name="alignAcc1">
+    <dgm:fillClrLst meth="repeat">
+      <a:schemeClr val="lt1">
+        <a:alpha val="90000"/>
+      </a:schemeClr>
+    </dgm:fillClrLst>
+    <dgm:linClrLst meth="repeat">
+      <a:schemeClr val="accent1"/>
+    </dgm:linClrLst>
+    <dgm:effectClrLst/>
+    <dgm:txLinClrLst/>
+    <dgm:txFillClrLst meth="repeat">
+      <a:schemeClr val="dk1"/>
+    </dgm:txFillClrLst>
+    <dgm:txEffectClrLst/>
+  </dgm:styleLbl>
+  <dgm:styleLbl name="trAlignAcc1">
+    <dgm:fillClrLst meth="repeat">
+      <a:schemeClr val="lt1">
+        <a:alpha val="40000"/>
+      </a:schemeClr>
+    </dgm:fillClrLst>
+    <dgm:linClrLst meth="repeat">
+      <a:schemeClr val="accent1"/>
+    </dgm:linClrLst>
+    <dgm:effectClrLst/>
+    <dgm:txLinClrLst/>
+    <dgm:txFillClrLst meth="repeat">
+      <a:schemeClr val="dk1"/>
+    </dgm:txFillClrLst>
+    <dgm:txEffectClrLst/>
+  </dgm:styleLbl>
+  <dgm:styleLbl name="bgAcc1">
+    <dgm:fillClrLst meth="repeat">
+      <a:schemeClr val="lt1">
+        <a:alpha val="90000"/>
+      </a:schemeClr>
+    </dgm:fillClrLst>
+    <dgm:linClrLst meth="repeat">
+      <a:schemeClr val="accent1"/>
+    </dgm:linClrLst>
+    <dgm:effectClrLst/>
+    <dgm:txLinClrLst/>
+    <dgm:txFillClrLst meth="repeat">
+      <a:schemeClr val="dk1"/>
+    </dgm:txFillClrLst>
+    <dgm:txEffectClrLst/>
+  </dgm:styleLbl>
+  <dgm:styleLbl name="solidFgAcc1">
+    <dgm:fillClrLst meth="repeat">
+      <a:schemeClr val="lt1"/>
+    </dgm:fillClrLst>
+    <dgm:linClrLst meth="repeat">
+      <a:schemeClr val="accent1"/>
+    </dgm:linClrLst>
+    <dgm:effectClrLst/>
+    <dgm:txLinClrLst/>
+    <dgm:txFillClrLst meth="repeat">
+      <a:schemeClr val="dk1"/>
+    </dgm:txFillClrLst>
+    <dgm:txEffectClrLst/>
+  </dgm:styleLbl>
+  <dgm:styleLbl name="solidAlignAcc1">
+    <dgm:fillClrLst meth="repeat">
+      <a:schemeClr val="lt1"/>
+    </dgm:fillClrLst>
+    <dgm:linClrLst meth="repeat">
+      <a:schemeClr val="accent1"/>
+    </dgm:linClrLst>
+    <dgm:effectClrLst/>
+    <dgm:txLinClrLst/>
+    <dgm:txFillClrLst meth="repeat">
+      <a:schemeClr val="dk1"/>
+    </dgm:txFillClrLst>
+    <dgm:txEffectClrLst/>
+  </dgm:styleLbl>
+  <dgm:styleLbl name="solidBgAcc1">
+    <dgm:fillClrLst meth="repeat">
+      <a:schemeClr val="lt1"/>
+    </dgm:fillClrLst>
+    <dgm:linClrLst meth="repeat">
+      <a:schemeClr val="accent1"/>
+    </dgm:linClrLst>
+    <dgm:effectClrLst/>
+    <dgm:txLinClrLst/>
+    <dgm:txFillClrLst meth="repeat">
+      <a:schemeClr val="dk1"/>
+    </dgm:txFillClrLst>
+    <dgm:txEffectClrLst/>
+  </dgm:styleLbl>
+  <dgm:styleLbl name="fgAccFollowNode1">
+    <dgm:fillClrLst meth="repeat">
+      <a:schemeClr val="accent1">
+        <a:alpha val="90000"/>
+        <a:tint val="40000"/>
+      </a:schemeClr>
+    </dgm:fillClrLst>
+    <dgm:linClrLst meth="repeat">
+      <a:schemeClr val="accent1">
+        <a:alpha val="90000"/>
+        <a:tint val="40000"/>
+      </a:schemeClr>
+    </dgm:linClrLst>
+    <dgm:effectClrLst/>
+    <dgm:txLinClrLst/>
+    <dgm:txFillClrLst meth="repeat">
+      <a:schemeClr val="dk1"/>
+    </dgm:txFillClrLst>
+    <dgm:txEffectClrLst/>
+  </dgm:styleLbl>
+  <dgm:styleLbl name="alignAccFollowNode1">
+    <dgm:fillClrLst meth="repeat">
+      <a:schemeClr val="accent1">
+        <a:alpha val="90000"/>
+        <a:tint val="40000"/>
+      </a:schemeClr>
+    </dgm:fillClrLst>
+    <dgm:linClrLst meth="repeat">
+      <a:schemeClr val="accent1">
+        <a:alpha val="90000"/>
+        <a:tint val="40000"/>
+      </a:schemeClr>
+    </dgm:linClrLst>
+    <dgm:effectClrLst/>
+    <dgm:txLinClrLst/>
+    <dgm:txFillClrLst meth="repeat">
+      <a:schemeClr val="dk1"/>
+    </dgm:txFillClrLst>
+    <dgm:txEffectClrLst/>
+  </dgm:styleLbl>
+  <dgm:styleLbl name="bgAccFollowNode1">
+    <dgm:fillClrLst meth="repeat">
+      <a:schemeClr val="accent1">
+        <a:alpha val="90000"/>
+        <a:tint val="40000"/>
+      </a:schemeClr>
+    </dgm:fillClrLst>
+    <dgm:linClrLst meth="repeat">
+      <a:schemeClr val="accent1">
+        <a:alpha val="90000"/>
+        <a:tint val="40000"/>
+      </a:schemeClr>
+    </dgm:linClrLst>
+    <dgm:effectClrLst/>
+    <dgm:txLinClrLst/>
+    <dgm:txFillClrLst meth="repeat">
+      <a:schemeClr val="dk1"/>
+    </dgm:txFillClrLst>
+    <dgm:txEffectClrLst/>
+  </dgm:styleLbl>
+  <dgm:styleLbl name="fgAcc0">
+    <dgm:fillClrLst meth="repeat">
+      <a:schemeClr val="lt1">
+        <a:alpha val="90000"/>
+      </a:schemeClr>
+    </dgm:fillClrLst>
+    <dgm:linClrLst meth="repeat">
+      <a:schemeClr val="accent1"/>
+    </dgm:linClrLst>
+    <dgm:effectClrLst/>
+    <dgm:txLinClrLst/>
+    <dgm:txFillClrLst meth="repeat">
+      <a:schemeClr val="dk1"/>
+    </dgm:txFillClrLst>
+    <dgm:txEffectClrLst/>
+  </dgm:styleLbl>
+  <dgm:styleLbl name="fgAcc2">
+    <dgm:fillClrLst meth="repeat">
+      <a:schemeClr val="lt1">
+        <a:alpha val="90000"/>
+      </a:schemeClr>
+    </dgm:fillClrLst>
+    <dgm:linClrLst meth="repeat">
+      <a:schemeClr val="accent1"/>
+    </dgm:linClrLst>
+    <dgm:effectClrLst/>
+    <dgm:txLinClrLst/>
+    <dgm:txFillClrLst meth="repeat">
+      <a:schemeClr val="dk1"/>
+    </dgm:txFillClrLst>
+    <dgm:txEffectClrLst/>
+  </dgm:styleLbl>
+  <dgm:styleLbl name="fgAcc3">
+    <dgm:fillClrLst meth="repeat">
+      <a:schemeClr val="lt1">
+        <a:alpha val="90000"/>
+      </a:schemeClr>
+    </dgm:fillClrLst>
+    <dgm:linClrLst meth="repeat">
+      <a:schemeClr val="accent1"/>
+    </dgm:linClrLst>
+    <dgm:effectClrLst/>
+    <dgm:txLinClrLst/>
+    <dgm:txFillClrLst meth="repeat">
+      <a:schemeClr val="dk1"/>
+    </dgm:txFillClrLst>
+    <dgm:txEffectClrLst/>
+  </dgm:styleLbl>
+  <dgm:styleLbl name="fgAcc4">
+    <dgm:fillClrLst meth="repeat">
+      <a:schemeClr val="lt1">
+        <a:alpha val="90000"/>
+      </a:schemeClr>
+    </dgm:fillClrLst>
+    <dgm:linClrLst meth="repeat">
+      <a:schemeClr val="accent1"/>
+    </dgm:linClrLst>
+    <dgm:effectClrLst/>
+    <dgm:txLinClrLst/>
+    <dgm:txFillClrLst meth="repeat">
+      <a:schemeClr val="dk1"/>
+    </dgm:txFillClrLst>
+    <dgm:txEffectClrLst/>
+  </dgm:styleLbl>
+  <dgm:styleLbl name="bgShp">
+    <dgm:fillClrLst meth="repeat">
+      <a:schemeClr val="accent1">
+        <a:tint val="40000"/>
+      </a:schemeClr>
+    </dgm:fillClrLst>
+    <dgm:linClrLst meth="repeat">
+      <a:schemeClr val="accent1"/>
+    </dgm:linClrLst>
+    <dgm:effectClrLst/>
+    <dgm:txLinClrLst/>
+    <dgm:txFillClrLst meth="repeat">
+      <a:schemeClr val="dk1"/>
+    </dgm:txFillClrLst>
+    <dgm:txEffectClrLst/>
+  </dgm:styleLbl>
+  <dgm:styleLbl name="dkBgShp">
+    <dgm:fillClrLst meth="repeat">
+      <a:schemeClr val="accent1">
+        <a:shade val="80000"/>
+      </a:schemeClr>
+    </dgm:fillClrLst>
+    <dgm:linClrLst meth="repeat">
+      <a:schemeClr val="accent1"/>
+    </dgm:linClrLst>
+    <dgm:effectClrLst/>
+    <dgm:txLinClrLst/>
+    <dgm:txFillClrLst meth="repeat">
+      <a:schemeClr val="lt1"/>
+    </dgm:txFillClrLst>
+    <dgm:txEffectClrLst/>
+  </dgm:styleLbl>
+  <dgm:styleLbl name="trBgShp">
+    <dgm:fillClrLst meth="repeat">
+      <a:schemeClr val="accent1">
+        <a:tint val="50000"/>
+        <a:alpha val="40000"/>
+      </a:schemeClr>
+    </dgm:fillClrLst>
+    <dgm:linClrLst meth="repeat">
+      <a:schemeClr val="accent1"/>
+    </dgm:linClrLst>
+    <dgm:effectClrLst/>
+    <dgm:txLinClrLst/>
+    <dgm:txFillClrLst meth="repeat">
+      <a:schemeClr val="lt1"/>
+    </dgm:txFillClrLst>
+    <dgm:txEffectClrLst/>
+  </dgm:styleLbl>
+  <dgm:styleLbl name="fgShp">
+    <dgm:fillClrLst meth="repeat">
+      <a:schemeClr val="accent1">
+        <a:tint val="60000"/>
+      </a:schemeClr>
+    </dgm:fillClrLst>
+    <dgm:linClrLst meth="repeat">
+      <a:schemeClr val="lt1"/>
+    </dgm:linClrLst>
+    <dgm:effectClrLst/>
+    <dgm:txLinClrLst/>
+    <dgm:txFillClrLst meth="repeat">
+      <a:schemeClr val="dk1"/>
+    </dgm:txFillClrLst>
+    <dgm:txEffectClrLst/>
+  </dgm:styleLbl>
+  <dgm:styleLbl name="revTx">
+    <dgm:fillClrLst meth="repeat">
+      <a:schemeClr val="lt1">
+        <a:alpha val="0"/>
+      </a:schemeClr>
+    </dgm:fillClrLst>
+    <dgm:linClrLst meth="repeat">
+      <a:schemeClr val="dk1">
+        <a:alpha val="0"/>
+      </a:schemeClr>
+    </dgm:linClrLst>
+    <dgm:effectClrLst/>
+    <dgm:txLinClrLst/>
+    <dgm:txFillClrLst meth="repeat">
+      <a:schemeClr val="tx1"/>
+    </dgm:txFillClrLst>
+    <dgm:txEffectClrLst/>
+  </dgm:styleLbl>
+</dgm:colorsDef>
+</file>
+
+<file path=ppt/diagrams/data1.xml><?xml version="1.0" encoding="utf-8"?>
+<dgm:dataModel xmlns:dgm="http://schemas.openxmlformats.org/drawingml/2006/diagram" xmlns:a="http://schemas.openxmlformats.org/drawingml/2006/main">
+  <dgm:ptLst>
+    <dgm:pt modelId="{82EDE632-5AD5-8144-8FFA-D9395C482524}" type="doc">
+      <dgm:prSet loTypeId="urn:microsoft.com/office/officeart/2005/8/layout/process1" loCatId="" qsTypeId="urn:microsoft.com/office/officeart/2005/8/quickstyle/simple1" qsCatId="simple" csTypeId="urn:microsoft.com/office/officeart/2005/8/colors/accent1_2" csCatId="accent1" phldr="1"/>
+      <dgm:spPr/>
+    </dgm:pt>
+    <dgm:pt modelId="{F8B0922F-0A90-D042-AB46-5F8464F3A094}">
+      <dgm:prSet phldrT="[Text]"/>
+      <dgm:spPr/>
+      <dgm:t>
+        <a:bodyPr/>
+        <a:lstStyle/>
+        <a:p>
+          <a:r>
+            <a:rPr lang="en-US" dirty="0"/>
+            <a:t>Data source: Wrangle JSON into Mongo</a:t>
+          </a:r>
+        </a:p>
+      </dgm:t>
+    </dgm:pt>
+    <dgm:pt modelId="{03A0AA0F-0834-8346-A14A-7D68F3CA9EE7}" type="parTrans" cxnId="{4276FA7E-DF49-3442-9EB8-E7AB450FFAD9}">
+      <dgm:prSet/>
+      <dgm:spPr/>
+      <dgm:t>
+        <a:bodyPr/>
+        <a:lstStyle/>
+        <a:p>
+          <a:endParaRPr lang="en-US"/>
+        </a:p>
+      </dgm:t>
+    </dgm:pt>
+    <dgm:pt modelId="{15377D78-0505-ED42-AFAF-25B39D0F3C47}" type="sibTrans" cxnId="{4276FA7E-DF49-3442-9EB8-E7AB450FFAD9}">
+      <dgm:prSet/>
+      <dgm:spPr/>
+      <dgm:t>
+        <a:bodyPr/>
+        <a:lstStyle/>
+        <a:p>
+          <a:endParaRPr lang="en-US"/>
+        </a:p>
+      </dgm:t>
+    </dgm:pt>
+    <dgm:pt modelId="{26B76824-C573-4E48-8B22-C78E282692B0}">
+      <dgm:prSet phldrT="[Text]"/>
+      <dgm:spPr/>
+      <dgm:t>
+        <a:bodyPr/>
+        <a:lstStyle/>
+        <a:p>
+          <a:r>
+            <a:rPr lang="en-US" dirty="0"/>
+            <a:t>Out to Hosting and Deploying - HTML (last)</a:t>
+          </a:r>
+        </a:p>
+      </dgm:t>
+    </dgm:pt>
+    <dgm:pt modelId="{5BA344DC-36FE-4D44-902A-B33BF8979A9E}" type="parTrans" cxnId="{2C229043-FDF9-3A4F-875C-9B8CADD30616}">
+      <dgm:prSet/>
+      <dgm:spPr/>
+      <dgm:t>
+        <a:bodyPr/>
+        <a:lstStyle/>
+        <a:p>
+          <a:endParaRPr lang="en-US"/>
+        </a:p>
+      </dgm:t>
+    </dgm:pt>
+    <dgm:pt modelId="{EF73622E-7D51-354E-BEED-61D53633751C}" type="sibTrans" cxnId="{2C229043-FDF9-3A4F-875C-9B8CADD30616}">
+      <dgm:prSet/>
+      <dgm:spPr/>
+      <dgm:t>
+        <a:bodyPr/>
+        <a:lstStyle/>
+        <a:p>
+          <a:endParaRPr lang="en-US"/>
+        </a:p>
+      </dgm:t>
+    </dgm:pt>
+    <dgm:pt modelId="{1410E54B-C413-1147-983F-4C340F218448}">
+      <dgm:prSet phldrT="[Text]"/>
+      <dgm:spPr/>
+      <dgm:t>
+        <a:bodyPr/>
+        <a:lstStyle/>
+        <a:p>
+          <a:r>
+            <a:rPr lang="en-US" dirty="0"/>
+            <a:t>Into Flask (RESTful API)</a:t>
+          </a:r>
+        </a:p>
+      </dgm:t>
+    </dgm:pt>
+    <dgm:pt modelId="{2C69A504-7963-174F-9424-0B5774CA5807}" type="parTrans" cxnId="{4EF30585-6F70-1849-AF9B-7414EE633D9A}">
+      <dgm:prSet/>
+      <dgm:spPr/>
+      <dgm:t>
+        <a:bodyPr/>
+        <a:lstStyle/>
+        <a:p>
+          <a:endParaRPr lang="en-US"/>
+        </a:p>
+      </dgm:t>
+    </dgm:pt>
+    <dgm:pt modelId="{0AA34C38-0FE3-E641-82DC-EFC4467BF73A}" type="sibTrans" cxnId="{4EF30585-6F70-1849-AF9B-7414EE633D9A}">
+      <dgm:prSet/>
+      <dgm:spPr/>
+      <dgm:t>
+        <a:bodyPr/>
+        <a:lstStyle/>
+        <a:p>
+          <a:endParaRPr lang="en-US"/>
+        </a:p>
+      </dgm:t>
+    </dgm:pt>
+    <dgm:pt modelId="{844DC441-12E1-8C41-AA03-5B56676A74E3}">
+      <dgm:prSet/>
+      <dgm:spPr/>
+      <dgm:t>
+        <a:bodyPr/>
+        <a:lstStyle/>
+        <a:p>
+          <a:r>
+            <a:rPr lang="en-US" dirty="0"/>
+            <a:t>Into </a:t>
+          </a:r>
+          <a:r>
+            <a:rPr lang="en-US" dirty="0" err="1"/>
+            <a:t>Javascript</a:t>
+          </a:r>
+          <a:r>
+            <a:rPr lang="en-US" dirty="0"/>
+            <a:t> Plotting</a:t>
+          </a:r>
+        </a:p>
+      </dgm:t>
+    </dgm:pt>
+    <dgm:pt modelId="{77B23C20-3D92-5948-AEEA-881EBBC5BAFE}" type="parTrans" cxnId="{C2B4874E-A8F1-B246-A46B-3D0813E192D7}">
+      <dgm:prSet/>
+      <dgm:spPr/>
+      <dgm:t>
+        <a:bodyPr/>
+        <a:lstStyle/>
+        <a:p>
+          <a:endParaRPr lang="en-US"/>
+        </a:p>
+      </dgm:t>
+    </dgm:pt>
+    <dgm:pt modelId="{7D68CEBC-5FFC-944D-BB5D-41BF6EEC2284}" type="sibTrans" cxnId="{C2B4874E-A8F1-B246-A46B-3D0813E192D7}">
+      <dgm:prSet/>
+      <dgm:spPr/>
+      <dgm:t>
+        <a:bodyPr/>
+        <a:lstStyle/>
+        <a:p>
+          <a:endParaRPr lang="en-US"/>
+        </a:p>
+      </dgm:t>
+    </dgm:pt>
+    <dgm:pt modelId="{BA3DB6F5-501B-CA43-9A73-1049BE14AD99}" type="pres">
+      <dgm:prSet presAssocID="{82EDE632-5AD5-8144-8FFA-D9395C482524}" presName="Name0" presStyleCnt="0">
+        <dgm:presLayoutVars>
+          <dgm:dir/>
+          <dgm:resizeHandles val="exact"/>
+        </dgm:presLayoutVars>
+      </dgm:prSet>
+      <dgm:spPr/>
+    </dgm:pt>
+    <dgm:pt modelId="{C022FF01-FEA0-824B-93C1-673492170337}" type="pres">
+      <dgm:prSet presAssocID="{F8B0922F-0A90-D042-AB46-5F8464F3A094}" presName="node" presStyleLbl="node1" presStyleIdx="0" presStyleCnt="4">
+        <dgm:presLayoutVars>
+          <dgm:bulletEnabled val="1"/>
+        </dgm:presLayoutVars>
+      </dgm:prSet>
+      <dgm:spPr/>
+    </dgm:pt>
+    <dgm:pt modelId="{8BE112AC-E565-4243-A30D-CA08A81D8B71}" type="pres">
+      <dgm:prSet presAssocID="{15377D78-0505-ED42-AFAF-25B39D0F3C47}" presName="sibTrans" presStyleLbl="sibTrans2D1" presStyleIdx="0" presStyleCnt="3"/>
+      <dgm:spPr/>
+    </dgm:pt>
+    <dgm:pt modelId="{BAC1C1E0-26D5-454B-80F3-A5DA26D6EC25}" type="pres">
+      <dgm:prSet presAssocID="{15377D78-0505-ED42-AFAF-25B39D0F3C47}" presName="connectorText" presStyleLbl="sibTrans2D1" presStyleIdx="0" presStyleCnt="3"/>
+      <dgm:spPr/>
+    </dgm:pt>
+    <dgm:pt modelId="{A09A07DC-0410-5C41-9E24-6D0D57B4FC75}" type="pres">
+      <dgm:prSet presAssocID="{1410E54B-C413-1147-983F-4C340F218448}" presName="node" presStyleLbl="node1" presStyleIdx="1" presStyleCnt="4">
+        <dgm:presLayoutVars>
+          <dgm:bulletEnabled val="1"/>
+        </dgm:presLayoutVars>
+      </dgm:prSet>
+      <dgm:spPr/>
+    </dgm:pt>
+    <dgm:pt modelId="{70EC7CFA-1AF2-704A-96BF-2A98D552E666}" type="pres">
+      <dgm:prSet presAssocID="{0AA34C38-0FE3-E641-82DC-EFC4467BF73A}" presName="sibTrans" presStyleLbl="sibTrans2D1" presStyleIdx="1" presStyleCnt="3"/>
+      <dgm:spPr/>
+    </dgm:pt>
+    <dgm:pt modelId="{E72BB9B6-A84A-2241-ACBB-580B8887C62F}" type="pres">
+      <dgm:prSet presAssocID="{0AA34C38-0FE3-E641-82DC-EFC4467BF73A}" presName="connectorText" presStyleLbl="sibTrans2D1" presStyleIdx="1" presStyleCnt="3"/>
+      <dgm:spPr/>
+    </dgm:pt>
+    <dgm:pt modelId="{F8D25341-185F-EB4C-A909-0871E65C293A}" type="pres">
+      <dgm:prSet presAssocID="{844DC441-12E1-8C41-AA03-5B56676A74E3}" presName="node" presStyleLbl="node1" presStyleIdx="2" presStyleCnt="4">
+        <dgm:presLayoutVars>
+          <dgm:bulletEnabled val="1"/>
+        </dgm:presLayoutVars>
+      </dgm:prSet>
+      <dgm:spPr/>
+    </dgm:pt>
+    <dgm:pt modelId="{D2BFADCD-1029-B64F-8751-DC000DEFE285}" type="pres">
+      <dgm:prSet presAssocID="{7D68CEBC-5FFC-944D-BB5D-41BF6EEC2284}" presName="sibTrans" presStyleLbl="sibTrans2D1" presStyleIdx="2" presStyleCnt="3"/>
+      <dgm:spPr/>
+    </dgm:pt>
+    <dgm:pt modelId="{24421672-A1B0-9B4C-A145-7C02EDEF6803}" type="pres">
+      <dgm:prSet presAssocID="{7D68CEBC-5FFC-944D-BB5D-41BF6EEC2284}" presName="connectorText" presStyleLbl="sibTrans2D1" presStyleIdx="2" presStyleCnt="3"/>
+      <dgm:spPr/>
+    </dgm:pt>
+    <dgm:pt modelId="{94F59823-35C4-554A-8FAF-3CDC42C2D10D}" type="pres">
+      <dgm:prSet presAssocID="{26B76824-C573-4E48-8B22-C78E282692B0}" presName="node" presStyleLbl="node1" presStyleIdx="3" presStyleCnt="4">
+        <dgm:presLayoutVars>
+          <dgm:bulletEnabled val="1"/>
+        </dgm:presLayoutVars>
+      </dgm:prSet>
+      <dgm:spPr/>
+    </dgm:pt>
+  </dgm:ptLst>
+  <dgm:cxnLst>
+    <dgm:cxn modelId="{FBB38713-4C0F-1649-8780-22828038C07A}" type="presOf" srcId="{7D68CEBC-5FFC-944D-BB5D-41BF6EEC2284}" destId="{24421672-A1B0-9B4C-A145-7C02EDEF6803}" srcOrd="1" destOrd="0" presId="urn:microsoft.com/office/officeart/2005/8/layout/process1"/>
+    <dgm:cxn modelId="{BCDA771E-17C6-D84B-92C1-7FB0B01B237D}" type="presOf" srcId="{0AA34C38-0FE3-E641-82DC-EFC4467BF73A}" destId="{E72BB9B6-A84A-2241-ACBB-580B8887C62F}" srcOrd="1" destOrd="0" presId="urn:microsoft.com/office/officeart/2005/8/layout/process1"/>
+    <dgm:cxn modelId="{C5E8C83E-4A34-3145-945F-36CD607DBA33}" type="presOf" srcId="{15377D78-0505-ED42-AFAF-25B39D0F3C47}" destId="{BAC1C1E0-26D5-454B-80F3-A5DA26D6EC25}" srcOrd="1" destOrd="0" presId="urn:microsoft.com/office/officeart/2005/8/layout/process1"/>
+    <dgm:cxn modelId="{3E0F7E41-D6FE-7E41-B531-17122E40E2FF}" type="presOf" srcId="{15377D78-0505-ED42-AFAF-25B39D0F3C47}" destId="{8BE112AC-E565-4243-A30D-CA08A81D8B71}" srcOrd="0" destOrd="0" presId="urn:microsoft.com/office/officeart/2005/8/layout/process1"/>
+    <dgm:cxn modelId="{2C229043-FDF9-3A4F-875C-9B8CADD30616}" srcId="{82EDE632-5AD5-8144-8FFA-D9395C482524}" destId="{26B76824-C573-4E48-8B22-C78E282692B0}" srcOrd="3" destOrd="0" parTransId="{5BA344DC-36FE-4D44-902A-B33BF8979A9E}" sibTransId="{EF73622E-7D51-354E-BEED-61D53633751C}"/>
+    <dgm:cxn modelId="{C2B4874E-A8F1-B246-A46B-3D0813E192D7}" srcId="{82EDE632-5AD5-8144-8FFA-D9395C482524}" destId="{844DC441-12E1-8C41-AA03-5B56676A74E3}" srcOrd="2" destOrd="0" parTransId="{77B23C20-3D92-5948-AEEA-881EBBC5BAFE}" sibTransId="{7D68CEBC-5FFC-944D-BB5D-41BF6EEC2284}"/>
+    <dgm:cxn modelId="{FC349573-031D-5743-B794-44C812470B45}" type="presOf" srcId="{26B76824-C573-4E48-8B22-C78E282692B0}" destId="{94F59823-35C4-554A-8FAF-3CDC42C2D10D}" srcOrd="0" destOrd="0" presId="urn:microsoft.com/office/officeart/2005/8/layout/process1"/>
+    <dgm:cxn modelId="{4276FA7E-DF49-3442-9EB8-E7AB450FFAD9}" srcId="{82EDE632-5AD5-8144-8FFA-D9395C482524}" destId="{F8B0922F-0A90-D042-AB46-5F8464F3A094}" srcOrd="0" destOrd="0" parTransId="{03A0AA0F-0834-8346-A14A-7D68F3CA9EE7}" sibTransId="{15377D78-0505-ED42-AFAF-25B39D0F3C47}"/>
+    <dgm:cxn modelId="{4EF30585-6F70-1849-AF9B-7414EE633D9A}" srcId="{82EDE632-5AD5-8144-8FFA-D9395C482524}" destId="{1410E54B-C413-1147-983F-4C340F218448}" srcOrd="1" destOrd="0" parTransId="{2C69A504-7963-174F-9424-0B5774CA5807}" sibTransId="{0AA34C38-0FE3-E641-82DC-EFC4467BF73A}"/>
+    <dgm:cxn modelId="{DF5CD4B7-14A4-B442-8954-90E9D845FC6D}" type="presOf" srcId="{82EDE632-5AD5-8144-8FFA-D9395C482524}" destId="{BA3DB6F5-501B-CA43-9A73-1049BE14AD99}" srcOrd="0" destOrd="0" presId="urn:microsoft.com/office/officeart/2005/8/layout/process1"/>
+    <dgm:cxn modelId="{1A67CFC2-4228-784C-9AB7-1A9124421D78}" type="presOf" srcId="{F8B0922F-0A90-D042-AB46-5F8464F3A094}" destId="{C022FF01-FEA0-824B-93C1-673492170337}" srcOrd="0" destOrd="0" presId="urn:microsoft.com/office/officeart/2005/8/layout/process1"/>
+    <dgm:cxn modelId="{91C43AD5-15BD-604F-8239-8436C1168C03}" type="presOf" srcId="{844DC441-12E1-8C41-AA03-5B56676A74E3}" destId="{F8D25341-185F-EB4C-A909-0871E65C293A}" srcOrd="0" destOrd="0" presId="urn:microsoft.com/office/officeart/2005/8/layout/process1"/>
+    <dgm:cxn modelId="{4D3B17E2-89E5-AB4F-BD51-38B420EC5C97}" type="presOf" srcId="{7D68CEBC-5FFC-944D-BB5D-41BF6EEC2284}" destId="{D2BFADCD-1029-B64F-8751-DC000DEFE285}" srcOrd="0" destOrd="0" presId="urn:microsoft.com/office/officeart/2005/8/layout/process1"/>
+    <dgm:cxn modelId="{661147E3-9B1D-7D49-9444-A71F73F27736}" type="presOf" srcId="{1410E54B-C413-1147-983F-4C340F218448}" destId="{A09A07DC-0410-5C41-9E24-6D0D57B4FC75}" srcOrd="0" destOrd="0" presId="urn:microsoft.com/office/officeart/2005/8/layout/process1"/>
+    <dgm:cxn modelId="{65751EF2-E13C-9941-BD40-CCC4857BB948}" type="presOf" srcId="{0AA34C38-0FE3-E641-82DC-EFC4467BF73A}" destId="{70EC7CFA-1AF2-704A-96BF-2A98D552E666}" srcOrd="0" destOrd="0" presId="urn:microsoft.com/office/officeart/2005/8/layout/process1"/>
+    <dgm:cxn modelId="{70B7B34D-8772-E042-B574-8A79FC96BD17}" type="presParOf" srcId="{BA3DB6F5-501B-CA43-9A73-1049BE14AD99}" destId="{C022FF01-FEA0-824B-93C1-673492170337}" srcOrd="0" destOrd="0" presId="urn:microsoft.com/office/officeart/2005/8/layout/process1"/>
+    <dgm:cxn modelId="{B6B01BAD-FC49-CC4A-9974-87CDC7CAF6D0}" type="presParOf" srcId="{BA3DB6F5-501B-CA43-9A73-1049BE14AD99}" destId="{8BE112AC-E565-4243-A30D-CA08A81D8B71}" srcOrd="1" destOrd="0" presId="urn:microsoft.com/office/officeart/2005/8/layout/process1"/>
+    <dgm:cxn modelId="{1ACB4296-992C-FC42-BDF4-6A91658C14B3}" type="presParOf" srcId="{8BE112AC-E565-4243-A30D-CA08A81D8B71}" destId="{BAC1C1E0-26D5-454B-80F3-A5DA26D6EC25}" srcOrd="0" destOrd="0" presId="urn:microsoft.com/office/officeart/2005/8/layout/process1"/>
+    <dgm:cxn modelId="{87F74ABC-1EC5-C74E-BDB2-EF5ACB29A459}" type="presParOf" srcId="{BA3DB6F5-501B-CA43-9A73-1049BE14AD99}" destId="{A09A07DC-0410-5C41-9E24-6D0D57B4FC75}" srcOrd="2" destOrd="0" presId="urn:microsoft.com/office/officeart/2005/8/layout/process1"/>
+    <dgm:cxn modelId="{0C7C610D-54D7-6C43-9F71-B5D01177E812}" type="presParOf" srcId="{BA3DB6F5-501B-CA43-9A73-1049BE14AD99}" destId="{70EC7CFA-1AF2-704A-96BF-2A98D552E666}" srcOrd="3" destOrd="0" presId="urn:microsoft.com/office/officeart/2005/8/layout/process1"/>
+    <dgm:cxn modelId="{99C05610-3F8E-E34C-8013-D5351B6D5642}" type="presParOf" srcId="{70EC7CFA-1AF2-704A-96BF-2A98D552E666}" destId="{E72BB9B6-A84A-2241-ACBB-580B8887C62F}" srcOrd="0" destOrd="0" presId="urn:microsoft.com/office/officeart/2005/8/layout/process1"/>
+    <dgm:cxn modelId="{76374023-C3EA-1E40-A84F-6F017F349FC0}" type="presParOf" srcId="{BA3DB6F5-501B-CA43-9A73-1049BE14AD99}" destId="{F8D25341-185F-EB4C-A909-0871E65C293A}" srcOrd="4" destOrd="0" presId="urn:microsoft.com/office/officeart/2005/8/layout/process1"/>
+    <dgm:cxn modelId="{4B5AB25C-6D66-E74B-A171-5A016104FF91}" type="presParOf" srcId="{BA3DB6F5-501B-CA43-9A73-1049BE14AD99}" destId="{D2BFADCD-1029-B64F-8751-DC000DEFE285}" srcOrd="5" destOrd="0" presId="urn:microsoft.com/office/officeart/2005/8/layout/process1"/>
+    <dgm:cxn modelId="{7DB06F92-B06D-6349-A5EF-1A30ABA516F6}" type="presParOf" srcId="{D2BFADCD-1029-B64F-8751-DC000DEFE285}" destId="{24421672-A1B0-9B4C-A145-7C02EDEF6803}" srcOrd="0" destOrd="0" presId="urn:microsoft.com/office/officeart/2005/8/layout/process1"/>
+    <dgm:cxn modelId="{DB31578D-66CD-CE47-AF8A-085DCE1917FB}" type="presParOf" srcId="{BA3DB6F5-501B-CA43-9A73-1049BE14AD99}" destId="{94F59823-35C4-554A-8FAF-3CDC42C2D10D}" srcOrd="6" destOrd="0" presId="urn:microsoft.com/office/officeart/2005/8/layout/process1"/>
+  </dgm:cxnLst>
+  <dgm:bg/>
+  <dgm:whole/>
+  <dgm:extLst>
+    <a:ext uri="http://schemas.microsoft.com/office/drawing/2008/diagram">
+      <dsp:dataModelExt xmlns:dsp="http://schemas.microsoft.com/office/drawing/2008/diagram" relId="rId6" minVer="http://schemas.openxmlformats.org/drawingml/2006/diagram"/>
+    </a:ext>
+  </dgm:extLst>
+</dgm:dataModel>
+</file>
+
+<file path=ppt/diagrams/drawing1.xml><?xml version="1.0" encoding="utf-8"?>
+<dsp:drawing xmlns:dgm="http://schemas.openxmlformats.org/drawingml/2006/diagram" xmlns:dsp="http://schemas.microsoft.com/office/drawing/2008/diagram" xmlns:a="http://schemas.openxmlformats.org/drawingml/2006/main">
+  <dsp:spTree>
+    <dsp:nvGrpSpPr>
+      <dsp:cNvPr id="0" name=""/>
+      <dsp:cNvGrpSpPr/>
+    </dsp:nvGrpSpPr>
+    <dsp:grpSpPr/>
+    <dsp:sp modelId="{C022FF01-FEA0-824B-93C1-673492170337}">
+      <dsp:nvSpPr>
+        <dsp:cNvPr id="0" name=""/>
+        <dsp:cNvSpPr/>
+      </dsp:nvSpPr>
+      <dsp:spPr>
+        <a:xfrm>
+          <a:off x="4621" y="408705"/>
+          <a:ext cx="2020453" cy="1212272"/>
+        </a:xfrm>
+        <a:prstGeom prst="roundRect">
+          <a:avLst>
+            <a:gd name="adj" fmla="val 10000"/>
+          </a:avLst>
+        </a:prstGeom>
+        <a:solidFill>
+          <a:schemeClr val="accent1">
+            <a:hueOff val="0"/>
+            <a:satOff val="0"/>
+            <a:lumOff val="0"/>
+            <a:alphaOff val="0"/>
+          </a:schemeClr>
+        </a:solidFill>
+        <a:ln w="12700" cap="flat" cmpd="sng" algn="ctr">
+          <a:solidFill>
+            <a:schemeClr val="lt1">
+              <a:hueOff val="0"/>
+              <a:satOff val="0"/>
+              <a:lumOff val="0"/>
+              <a:alphaOff val="0"/>
+            </a:schemeClr>
+          </a:solidFill>
+          <a:prstDash val="solid"/>
+          <a:miter lim="800000"/>
+        </a:ln>
+        <a:effectLst/>
+      </dsp:spPr>
+      <dsp:style>
+        <a:lnRef idx="2">
+          <a:scrgbClr r="0" g="0" b="0"/>
+        </a:lnRef>
+        <a:fillRef idx="1">
+          <a:scrgbClr r="0" g="0" b="0"/>
+        </a:fillRef>
+        <a:effectRef idx="0">
+          <a:scrgbClr r="0" g="0" b="0"/>
+        </a:effectRef>
+        <a:fontRef idx="minor">
+          <a:schemeClr val="lt1"/>
+        </a:fontRef>
+      </dsp:style>
+      <dsp:txBody>
+        <a:bodyPr spcFirstLastPara="0" vert="horz" wrap="square" lIns="87630" tIns="87630" rIns="87630" bIns="87630" numCol="1" spcCol="1270" anchor="ctr" anchorCtr="0">
+          <a:noAutofit/>
+        </a:bodyPr>
+        <a:lstStyle/>
+        <a:p>
+          <a:pPr marL="0" lvl="0" indent="0" algn="ctr" defTabSz="1022350">
+            <a:lnSpc>
+              <a:spcPct val="90000"/>
+            </a:lnSpc>
+            <a:spcBef>
+              <a:spcPct val="0"/>
+            </a:spcBef>
+            <a:spcAft>
+              <a:spcPct val="35000"/>
+            </a:spcAft>
+            <a:buNone/>
+          </a:pPr>
+          <a:r>
+            <a:rPr lang="en-US" sz="2300" kern="1200" dirty="0"/>
+            <a:t>Data source: Wrangle JSON into Mongo</a:t>
+          </a:r>
+        </a:p>
+      </dsp:txBody>
+      <dsp:txXfrm>
+        <a:off x="40127" y="444211"/>
+        <a:ext cx="1949441" cy="1141260"/>
+      </dsp:txXfrm>
+    </dsp:sp>
+    <dsp:sp modelId="{8BE112AC-E565-4243-A30D-CA08A81D8B71}">
+      <dsp:nvSpPr>
+        <dsp:cNvPr id="0" name=""/>
+        <dsp:cNvSpPr/>
+      </dsp:nvSpPr>
+      <dsp:spPr>
+        <a:xfrm>
+          <a:off x="2227119" y="764305"/>
+          <a:ext cx="428336" cy="501072"/>
+        </a:xfrm>
+        <a:prstGeom prst="rightArrow">
+          <a:avLst>
+            <a:gd name="adj1" fmla="val 60000"/>
+            <a:gd name="adj2" fmla="val 50000"/>
+          </a:avLst>
+        </a:prstGeom>
+        <a:solidFill>
+          <a:schemeClr val="accent1">
+            <a:tint val="60000"/>
+            <a:hueOff val="0"/>
+            <a:satOff val="0"/>
+            <a:lumOff val="0"/>
+            <a:alphaOff val="0"/>
+          </a:schemeClr>
+        </a:solidFill>
+        <a:ln>
+          <a:noFill/>
+        </a:ln>
+        <a:effectLst/>
+      </dsp:spPr>
+      <dsp:style>
+        <a:lnRef idx="0">
+          <a:scrgbClr r="0" g="0" b="0"/>
+        </a:lnRef>
+        <a:fillRef idx="1">
+          <a:scrgbClr r="0" g="0" b="0"/>
+        </a:fillRef>
+        <a:effectRef idx="0">
+          <a:scrgbClr r="0" g="0" b="0"/>
+        </a:effectRef>
+        <a:fontRef idx="minor">
+          <a:schemeClr val="lt1"/>
+        </a:fontRef>
+      </dsp:style>
+      <dsp:txBody>
+        <a:bodyPr spcFirstLastPara="0" vert="horz" wrap="square" lIns="0" tIns="0" rIns="0" bIns="0" numCol="1" spcCol="1270" anchor="ctr" anchorCtr="0">
+          <a:noAutofit/>
+        </a:bodyPr>
+        <a:lstStyle/>
+        <a:p>
+          <a:pPr marL="0" lvl="0" indent="0" algn="ctr" defTabSz="844550">
+            <a:lnSpc>
+              <a:spcPct val="90000"/>
+            </a:lnSpc>
+            <a:spcBef>
+              <a:spcPct val="0"/>
+            </a:spcBef>
+            <a:spcAft>
+              <a:spcPct val="35000"/>
+            </a:spcAft>
+            <a:buNone/>
+          </a:pPr>
+          <a:endParaRPr lang="en-US" sz="1900" kern="1200"/>
+        </a:p>
+      </dsp:txBody>
+      <dsp:txXfrm>
+        <a:off x="2227119" y="864519"/>
+        <a:ext cx="299835" cy="300644"/>
+      </dsp:txXfrm>
+    </dsp:sp>
+    <dsp:sp modelId="{A09A07DC-0410-5C41-9E24-6D0D57B4FC75}">
+      <dsp:nvSpPr>
+        <dsp:cNvPr id="0" name=""/>
+        <dsp:cNvSpPr/>
+      </dsp:nvSpPr>
+      <dsp:spPr>
+        <a:xfrm>
+          <a:off x="2833255" y="408705"/>
+          <a:ext cx="2020453" cy="1212272"/>
+        </a:xfrm>
+        <a:prstGeom prst="roundRect">
+          <a:avLst>
+            <a:gd name="adj" fmla="val 10000"/>
+          </a:avLst>
+        </a:prstGeom>
+        <a:solidFill>
+          <a:schemeClr val="accent1">
+            <a:hueOff val="0"/>
+            <a:satOff val="0"/>
+            <a:lumOff val="0"/>
+            <a:alphaOff val="0"/>
+          </a:schemeClr>
+        </a:solidFill>
+        <a:ln w="12700" cap="flat" cmpd="sng" algn="ctr">
+          <a:solidFill>
+            <a:schemeClr val="lt1">
+              <a:hueOff val="0"/>
+              <a:satOff val="0"/>
+              <a:lumOff val="0"/>
+              <a:alphaOff val="0"/>
+            </a:schemeClr>
+          </a:solidFill>
+          <a:prstDash val="solid"/>
+          <a:miter lim="800000"/>
+        </a:ln>
+        <a:effectLst/>
+      </dsp:spPr>
+      <dsp:style>
+        <a:lnRef idx="2">
+          <a:scrgbClr r="0" g="0" b="0"/>
+        </a:lnRef>
+        <a:fillRef idx="1">
+          <a:scrgbClr r="0" g="0" b="0"/>
+        </a:fillRef>
+        <a:effectRef idx="0">
+          <a:scrgbClr r="0" g="0" b="0"/>
+        </a:effectRef>
+        <a:fontRef idx="minor">
+          <a:schemeClr val="lt1"/>
+        </a:fontRef>
+      </dsp:style>
+      <dsp:txBody>
+        <a:bodyPr spcFirstLastPara="0" vert="horz" wrap="square" lIns="87630" tIns="87630" rIns="87630" bIns="87630" numCol="1" spcCol="1270" anchor="ctr" anchorCtr="0">
+          <a:noAutofit/>
+        </a:bodyPr>
+        <a:lstStyle/>
+        <a:p>
+          <a:pPr marL="0" lvl="0" indent="0" algn="ctr" defTabSz="1022350">
+            <a:lnSpc>
+              <a:spcPct val="90000"/>
+            </a:lnSpc>
+            <a:spcBef>
+              <a:spcPct val="0"/>
+            </a:spcBef>
+            <a:spcAft>
+              <a:spcPct val="35000"/>
+            </a:spcAft>
+            <a:buNone/>
+          </a:pPr>
+          <a:r>
+            <a:rPr lang="en-US" sz="2300" kern="1200" dirty="0"/>
+            <a:t>Into Flask (RESTful API)</a:t>
+          </a:r>
+        </a:p>
+      </dsp:txBody>
+      <dsp:txXfrm>
+        <a:off x="2868761" y="444211"/>
+        <a:ext cx="1949441" cy="1141260"/>
+      </dsp:txXfrm>
+    </dsp:sp>
+    <dsp:sp modelId="{70EC7CFA-1AF2-704A-96BF-2A98D552E666}">
+      <dsp:nvSpPr>
+        <dsp:cNvPr id="0" name=""/>
+        <dsp:cNvSpPr/>
+      </dsp:nvSpPr>
+      <dsp:spPr>
+        <a:xfrm>
+          <a:off x="5055754" y="764305"/>
+          <a:ext cx="428336" cy="501072"/>
+        </a:xfrm>
+        <a:prstGeom prst="rightArrow">
+          <a:avLst>
+            <a:gd name="adj1" fmla="val 60000"/>
+            <a:gd name="adj2" fmla="val 50000"/>
+          </a:avLst>
+        </a:prstGeom>
+        <a:solidFill>
+          <a:schemeClr val="accent1">
+            <a:tint val="60000"/>
+            <a:hueOff val="0"/>
+            <a:satOff val="0"/>
+            <a:lumOff val="0"/>
+            <a:alphaOff val="0"/>
+          </a:schemeClr>
+        </a:solidFill>
+        <a:ln>
+          <a:noFill/>
+        </a:ln>
+        <a:effectLst/>
+      </dsp:spPr>
+      <dsp:style>
+        <a:lnRef idx="0">
+          <a:scrgbClr r="0" g="0" b="0"/>
+        </a:lnRef>
+        <a:fillRef idx="1">
+          <a:scrgbClr r="0" g="0" b="0"/>
+        </a:fillRef>
+        <a:effectRef idx="0">
+          <a:scrgbClr r="0" g="0" b="0"/>
+        </a:effectRef>
+        <a:fontRef idx="minor">
+          <a:schemeClr val="lt1"/>
+        </a:fontRef>
+      </dsp:style>
+      <dsp:txBody>
+        <a:bodyPr spcFirstLastPara="0" vert="horz" wrap="square" lIns="0" tIns="0" rIns="0" bIns="0" numCol="1" spcCol="1270" anchor="ctr" anchorCtr="0">
+          <a:noAutofit/>
+        </a:bodyPr>
+        <a:lstStyle/>
+        <a:p>
+          <a:pPr marL="0" lvl="0" indent="0" algn="ctr" defTabSz="844550">
+            <a:lnSpc>
+              <a:spcPct val="90000"/>
+            </a:lnSpc>
+            <a:spcBef>
+              <a:spcPct val="0"/>
+            </a:spcBef>
+            <a:spcAft>
+              <a:spcPct val="35000"/>
+            </a:spcAft>
+            <a:buNone/>
+          </a:pPr>
+          <a:endParaRPr lang="en-US" sz="1900" kern="1200"/>
+        </a:p>
+      </dsp:txBody>
+      <dsp:txXfrm>
+        <a:off x="5055754" y="864519"/>
+        <a:ext cx="299835" cy="300644"/>
+      </dsp:txXfrm>
+    </dsp:sp>
+    <dsp:sp modelId="{F8D25341-185F-EB4C-A909-0871E65C293A}">
+      <dsp:nvSpPr>
+        <dsp:cNvPr id="0" name=""/>
+        <dsp:cNvSpPr/>
+      </dsp:nvSpPr>
+      <dsp:spPr>
+        <a:xfrm>
+          <a:off x="5661890" y="408705"/>
+          <a:ext cx="2020453" cy="1212272"/>
+        </a:xfrm>
+        <a:prstGeom prst="roundRect">
+          <a:avLst>
+            <a:gd name="adj" fmla="val 10000"/>
+          </a:avLst>
+        </a:prstGeom>
+        <a:solidFill>
+          <a:schemeClr val="accent1">
+            <a:hueOff val="0"/>
+            <a:satOff val="0"/>
+            <a:lumOff val="0"/>
+            <a:alphaOff val="0"/>
+          </a:schemeClr>
+        </a:solidFill>
+        <a:ln w="12700" cap="flat" cmpd="sng" algn="ctr">
+          <a:solidFill>
+            <a:schemeClr val="lt1">
+              <a:hueOff val="0"/>
+              <a:satOff val="0"/>
+              <a:lumOff val="0"/>
+              <a:alphaOff val="0"/>
+            </a:schemeClr>
+          </a:solidFill>
+          <a:prstDash val="solid"/>
+          <a:miter lim="800000"/>
+        </a:ln>
+        <a:effectLst/>
+      </dsp:spPr>
+      <dsp:style>
+        <a:lnRef idx="2">
+          <a:scrgbClr r="0" g="0" b="0"/>
+        </a:lnRef>
+        <a:fillRef idx="1">
+          <a:scrgbClr r="0" g="0" b="0"/>
+        </a:fillRef>
+        <a:effectRef idx="0">
+          <a:scrgbClr r="0" g="0" b="0"/>
+        </a:effectRef>
+        <a:fontRef idx="minor">
+          <a:schemeClr val="lt1"/>
+        </a:fontRef>
+      </dsp:style>
+      <dsp:txBody>
+        <a:bodyPr spcFirstLastPara="0" vert="horz" wrap="square" lIns="87630" tIns="87630" rIns="87630" bIns="87630" numCol="1" spcCol="1270" anchor="ctr" anchorCtr="0">
+          <a:noAutofit/>
+        </a:bodyPr>
+        <a:lstStyle/>
+        <a:p>
+          <a:pPr marL="0" lvl="0" indent="0" algn="ctr" defTabSz="1022350">
+            <a:lnSpc>
+              <a:spcPct val="90000"/>
+            </a:lnSpc>
+            <a:spcBef>
+              <a:spcPct val="0"/>
+            </a:spcBef>
+            <a:spcAft>
+              <a:spcPct val="35000"/>
+            </a:spcAft>
+            <a:buNone/>
+          </a:pPr>
+          <a:r>
+            <a:rPr lang="en-US" sz="2300" kern="1200" dirty="0"/>
+            <a:t>Into </a:t>
+          </a:r>
+          <a:r>
+            <a:rPr lang="en-US" sz="2300" kern="1200" dirty="0" err="1"/>
+            <a:t>Javascript</a:t>
+          </a:r>
+          <a:r>
+            <a:rPr lang="en-US" sz="2300" kern="1200" dirty="0"/>
+            <a:t> Plotting</a:t>
+          </a:r>
+        </a:p>
+      </dsp:txBody>
+      <dsp:txXfrm>
+        <a:off x="5697396" y="444211"/>
+        <a:ext cx="1949441" cy="1141260"/>
+      </dsp:txXfrm>
+    </dsp:sp>
+    <dsp:sp modelId="{D2BFADCD-1029-B64F-8751-DC000DEFE285}">
+      <dsp:nvSpPr>
+        <dsp:cNvPr id="0" name=""/>
+        <dsp:cNvSpPr/>
+      </dsp:nvSpPr>
+      <dsp:spPr>
+        <a:xfrm>
+          <a:off x="7884389" y="764305"/>
+          <a:ext cx="428336" cy="501072"/>
+        </a:xfrm>
+        <a:prstGeom prst="rightArrow">
+          <a:avLst>
+            <a:gd name="adj1" fmla="val 60000"/>
+            <a:gd name="adj2" fmla="val 50000"/>
+          </a:avLst>
+        </a:prstGeom>
+        <a:solidFill>
+          <a:schemeClr val="accent1">
+            <a:tint val="60000"/>
+            <a:hueOff val="0"/>
+            <a:satOff val="0"/>
+            <a:lumOff val="0"/>
+            <a:alphaOff val="0"/>
+          </a:schemeClr>
+        </a:solidFill>
+        <a:ln>
+          <a:noFill/>
+        </a:ln>
+        <a:effectLst/>
+      </dsp:spPr>
+      <dsp:style>
+        <a:lnRef idx="0">
+          <a:scrgbClr r="0" g="0" b="0"/>
+        </a:lnRef>
+        <a:fillRef idx="1">
+          <a:scrgbClr r="0" g="0" b="0"/>
+        </a:fillRef>
+        <a:effectRef idx="0">
+          <a:scrgbClr r="0" g="0" b="0"/>
+        </a:effectRef>
+        <a:fontRef idx="minor">
+          <a:schemeClr val="lt1"/>
+        </a:fontRef>
+      </dsp:style>
+      <dsp:txBody>
+        <a:bodyPr spcFirstLastPara="0" vert="horz" wrap="square" lIns="0" tIns="0" rIns="0" bIns="0" numCol="1" spcCol="1270" anchor="ctr" anchorCtr="0">
+          <a:noAutofit/>
+        </a:bodyPr>
+        <a:lstStyle/>
+        <a:p>
+          <a:pPr marL="0" lvl="0" indent="0" algn="ctr" defTabSz="844550">
+            <a:lnSpc>
+              <a:spcPct val="90000"/>
+            </a:lnSpc>
+            <a:spcBef>
+              <a:spcPct val="0"/>
+            </a:spcBef>
+            <a:spcAft>
+              <a:spcPct val="35000"/>
+            </a:spcAft>
+            <a:buNone/>
+          </a:pPr>
+          <a:endParaRPr lang="en-US" sz="1900" kern="1200"/>
+        </a:p>
+      </dsp:txBody>
+      <dsp:txXfrm>
+        <a:off x="7884389" y="864519"/>
+        <a:ext cx="299835" cy="300644"/>
+      </dsp:txXfrm>
+    </dsp:sp>
+    <dsp:sp modelId="{94F59823-35C4-554A-8FAF-3CDC42C2D10D}">
+      <dsp:nvSpPr>
+        <dsp:cNvPr id="0" name=""/>
+        <dsp:cNvSpPr/>
+      </dsp:nvSpPr>
+      <dsp:spPr>
+        <a:xfrm>
+          <a:off x="8490525" y="408705"/>
+          <a:ext cx="2020453" cy="1212272"/>
+        </a:xfrm>
+        <a:prstGeom prst="roundRect">
+          <a:avLst>
+            <a:gd name="adj" fmla="val 10000"/>
+          </a:avLst>
+        </a:prstGeom>
+        <a:solidFill>
+          <a:schemeClr val="accent1">
+            <a:hueOff val="0"/>
+            <a:satOff val="0"/>
+            <a:lumOff val="0"/>
+            <a:alphaOff val="0"/>
+          </a:schemeClr>
+        </a:solidFill>
+        <a:ln w="12700" cap="flat" cmpd="sng" algn="ctr">
+          <a:solidFill>
+            <a:schemeClr val="lt1">
+              <a:hueOff val="0"/>
+              <a:satOff val="0"/>
+              <a:lumOff val="0"/>
+              <a:alphaOff val="0"/>
+            </a:schemeClr>
+          </a:solidFill>
+          <a:prstDash val="solid"/>
+          <a:miter lim="800000"/>
+        </a:ln>
+        <a:effectLst/>
+      </dsp:spPr>
+      <dsp:style>
+        <a:lnRef idx="2">
+          <a:scrgbClr r="0" g="0" b="0"/>
+        </a:lnRef>
+        <a:fillRef idx="1">
+          <a:scrgbClr r="0" g="0" b="0"/>
+        </a:fillRef>
+        <a:effectRef idx="0">
+          <a:scrgbClr r="0" g="0" b="0"/>
+        </a:effectRef>
+        <a:fontRef idx="minor">
+          <a:schemeClr val="lt1"/>
+        </a:fontRef>
+      </dsp:style>
+      <dsp:txBody>
+        <a:bodyPr spcFirstLastPara="0" vert="horz" wrap="square" lIns="87630" tIns="87630" rIns="87630" bIns="87630" numCol="1" spcCol="1270" anchor="ctr" anchorCtr="0">
+          <a:noAutofit/>
+        </a:bodyPr>
+        <a:lstStyle/>
+        <a:p>
+          <a:pPr marL="0" lvl="0" indent="0" algn="ctr" defTabSz="1022350">
+            <a:lnSpc>
+              <a:spcPct val="90000"/>
+            </a:lnSpc>
+            <a:spcBef>
+              <a:spcPct val="0"/>
+            </a:spcBef>
+            <a:spcAft>
+              <a:spcPct val="35000"/>
+            </a:spcAft>
+            <a:buNone/>
+          </a:pPr>
+          <a:r>
+            <a:rPr lang="en-US" sz="2300" kern="1200" dirty="0"/>
+            <a:t>Out to Hosting and Deploying - HTML (last)</a:t>
+          </a:r>
+        </a:p>
+      </dsp:txBody>
+      <dsp:txXfrm>
+        <a:off x="8526031" y="444211"/>
+        <a:ext cx="1949441" cy="1141260"/>
+      </dsp:txXfrm>
+    </dsp:sp>
+  </dsp:spTree>
+</dsp:drawing>
+</file>
+
+<file path=ppt/diagrams/layout1.xml><?xml version="1.0" encoding="utf-8"?>
+<dgm:layoutDef xmlns:dgm="http://schemas.openxmlformats.org/drawingml/2006/diagram" xmlns:a="http://schemas.openxmlformats.org/drawingml/2006/main" uniqueId="urn:microsoft.com/office/officeart/2005/8/layout/process1">
+  <dgm:title val=""/>
+  <dgm:desc val=""/>
+  <dgm:catLst>
+    <dgm:cat type="process" pri="1000"/>
+    <dgm:cat type="convert" pri="15000"/>
+  </dgm:catLst>
+  <dgm:sampData useDef="1">
+    <dgm:dataModel>
+      <dgm:ptLst/>
+      <dgm:bg/>
+      <dgm:whole/>
+    </dgm:dataModel>
+  </dgm:sampData>
+  <dgm:styleData>
+    <dgm:dataModel>
+      <dgm:ptLst>
+        <dgm:pt modelId="0" type="doc"/>
+        <dgm:pt modelId="1"/>
+        <dgm:pt modelId="2"/>
+      </dgm:ptLst>
+      <dgm:cxnLst>
+        <dgm:cxn modelId="3" srcId="0" destId="1" srcOrd="0" destOrd="0"/>
+        <dgm:cxn modelId="4" srcId="0" destId="2" srcOrd="1" destOrd="0"/>
+      </dgm:cxnLst>
+      <dgm:bg/>
+      <dgm:whole/>
+    </dgm:dataModel>
+  </dgm:styleData>
+  <dgm:clrData>
+    <dgm:dataModel>
+      <dgm:ptLst>
+        <dgm:pt modelId="0" type="doc"/>
+        <dgm:pt modelId="1"/>
+        <dgm:pt modelId="2"/>
+        <dgm:pt modelId="3"/>
+        <dgm:pt modelId="4"/>
+      </dgm:ptLst>
+      <dgm:cxnLst>
+        <dgm:cxn modelId="5" srcId="0" destId="1" srcOrd="0" destOrd="0"/>
+        <dgm:cxn modelId="6" srcId="0" destId="2" srcOrd="1" destOrd="0"/>
+        <dgm:cxn modelId="7" srcId="0" destId="3" srcOrd="2" destOrd="0"/>
+        <dgm:cxn modelId="8" srcId="0" destId="4" srcOrd="3" destOrd="0"/>
+      </dgm:cxnLst>
+      <dgm:bg/>
+      <dgm:whole/>
+    </dgm:dataModel>
+  </dgm:clrData>
+  <dgm:layoutNode name="Name0">
+    <dgm:varLst>
+      <dgm:dir/>
+      <dgm:resizeHandles val="exact"/>
+    </dgm:varLst>
+    <dgm:choose name="Name1">
+      <dgm:if name="Name2" func="var" arg="dir" op="equ" val="norm">
+        <dgm:alg type="lin"/>
+      </dgm:if>
+      <dgm:else name="Name3">
+        <dgm:alg type="lin">
+          <dgm:param type="linDir" val="fromR"/>
+        </dgm:alg>
+      </dgm:else>
+    </dgm:choose>
+    <dgm:shape xmlns:r="http://schemas.openxmlformats.org/officeDocument/2006/relationships" r:blip="">
+      <dgm:adjLst/>
+    </dgm:shape>
+    <dgm:presOf/>
+    <dgm:constrLst>
+      <dgm:constr type="w" for="ch" ptType="node" refType="w"/>
+      <dgm:constr type="h" for="ch" ptType="node" op="equ"/>
+      <dgm:constr type="primFontSz" for="ch" ptType="node" op="equ" val="65"/>
+      <dgm:constr type="w" for="ch" ptType="sibTrans" refType="w" refFor="ch" refPtType="node" op="equ" fact="0.4"/>
+      <dgm:constr type="h" for="ch" ptType="sibTrans" op="equ"/>
+      <dgm:constr type="primFontSz" for="des" forName="connectorText" op="equ" val="55"/>
+      <dgm:constr type="primFontSz" for="des" forName="connectorText" refType="primFontSz" refFor="ch" refPtType="node" op="lte" fact="0.8"/>
+    </dgm:constrLst>
+    <dgm:ruleLst/>
+    <dgm:forEach name="nodesForEach" axis="ch" ptType="node">
+      <dgm:layoutNode name="node">
+        <dgm:varLst>
+          <dgm:bulletEnabled val="1"/>
+        </dgm:varLst>
+        <dgm:alg type="tx"/>
+        <dgm:shape xmlns:r="http://schemas.openxmlformats.org/officeDocument/2006/relationships" type="roundRect" r:blip="">
+          <dgm:adjLst>
+            <dgm:adj idx="1" val="0.1"/>
+          </dgm:adjLst>
+        </dgm:shape>
+        <dgm:presOf axis="desOrSelf" ptType="node"/>
+        <dgm:constrLst>
+          <dgm:constr type="h" refType="w" fact="0.6"/>
+          <dgm:constr type="tMarg" refType="primFontSz" fact="0.3"/>
+          <dgm:constr type="bMarg" refType="primFontSz" fact="0.3"/>
+          <dgm:constr type="lMarg" refType="primFontSz" fact="0.3"/>
+          <dgm:constr type="rMarg" refType="primFontSz" fact="0.3"/>
+        </dgm:constrLst>
+        <dgm:ruleLst>
+          <dgm:rule type="primFontSz" val="18" fact="NaN" max="NaN"/>
+          <dgm:rule type="h" val="NaN" fact="1.5" max="NaN"/>
+          <dgm:rule type="primFontSz" val="5" fact="NaN" max="NaN"/>
+          <dgm:rule type="h" val="INF" fact="NaN" max="NaN"/>
+        </dgm:ruleLst>
+      </dgm:layoutNode>
+      <dgm:forEach name="sibTransForEach" axis="followSib" ptType="sibTrans" cnt="1">
+        <dgm:layoutNode name="sibTrans">
+          <dgm:alg type="conn">
+            <dgm:param type="begPts" val="auto"/>
+            <dgm:param type="endPts" val="auto"/>
+          </dgm:alg>
+          <dgm:shape xmlns:r="http://schemas.openxmlformats.org/officeDocument/2006/relationships" type="conn" r:blip="">
+            <dgm:adjLst/>
+          </dgm:shape>
+          <dgm:presOf axis="self"/>
+          <dgm:constrLst>
+            <dgm:constr type="h" refType="w" fact="0.62"/>
+            <dgm:constr type="connDist"/>
+            <dgm:constr type="begPad" refType="connDist" fact="0.25"/>
+            <dgm:constr type="endPad" refType="connDist" fact="0.22"/>
+          </dgm:constrLst>
+          <dgm:ruleLst/>
+          <dgm:layoutNode name="connectorText">
+            <dgm:alg type="tx">
+              <dgm:param type="autoTxRot" val="grav"/>
+            </dgm:alg>
+            <dgm:shape xmlns:r="http://schemas.openxmlformats.org/officeDocument/2006/relationships" type="conn" r:blip="" hideGeom="1">
+              <dgm:adjLst/>
+            </dgm:shape>
+            <dgm:presOf axis="self"/>
+            <dgm:constrLst>
+              <dgm:constr type="lMarg"/>
+              <dgm:constr type="rMarg"/>
+              <dgm:constr type="tMarg"/>
+              <dgm:constr type="bMarg"/>
+            </dgm:constrLst>
+            <dgm:ruleLst>
+              <dgm:rule type="primFontSz" val="5" fact="NaN" max="NaN"/>
+            </dgm:ruleLst>
+          </dgm:layoutNode>
+        </dgm:layoutNode>
+      </dgm:forEach>
+    </dgm:forEach>
+  </dgm:layoutNode>
+</dgm:layoutDef>
+</file>
+
+<file path=ppt/diagrams/quickStyle1.xml><?xml version="1.0" encoding="utf-8"?>
+<dgm:styleDef xmlns:dgm="http://schemas.openxmlformats.org/drawingml/2006/diagram" xmlns:a="http://schemas.openxmlformats.org/drawingml/2006/main" uniqueId="urn:microsoft.com/office/officeart/2005/8/quickstyle/simple1">
+  <dgm:title val=""/>
+  <dgm:desc val=""/>
+  <dgm:catLst>
+    <dgm:cat type="simple" pri="10100"/>
+  </dgm:catLst>
+  <dgm:scene3d>
+    <a:camera prst="orthographicFront"/>
+    <a:lightRig rig="threePt" dir="t"/>
+  </dgm:scene3d>
+  <dgm:styleLbl name="node0">
+    <dgm:scene3d>
+      <a:camera prst="orthographicFront"/>
+      <a:lightRig rig="threePt" dir="t"/>
+    </dgm:scene3d>
+    <dgm:sp3d/>
+    <dgm:txPr/>
+    <dgm:style>
+      <a:lnRef idx="2">
+        <a:scrgbClr r="0" g="0" b="0"/>
+      </a:lnRef>
+      <a:fillRef idx="1">
+        <a:scrgbClr r="0" g="0" b="0"/>
+      </a:fillRef>
+      <a:effectRef idx="0">
+        <a:scrgbClr r="0" g="0" b="0"/>
+      </a:effectRef>
+      <a:fontRef idx="minor">
+        <a:schemeClr val="lt1"/>
+      </a:fontRef>
+    </dgm:style>
+  </dgm:styleLbl>
+  <dgm:styleLbl name="lnNode1">
+    <dgm:scene3d>
+      <a:camera prst="orthographicFront"/>
+      <a:lightRig rig="threePt" dir="t"/>
+    </dgm:scene3d>
+    <dgm:sp3d/>
+    <dgm:txPr/>
+    <dgm:style>
+      <a:lnRef idx="2">
+        <a:scrgbClr r="0" g="0" b="0"/>
+      </a:lnRef>
+      <a:fillRef idx="1">
+        <a:scrgbClr r="0" g="0" b="0"/>
+      </a:fillRef>
+      <a:effectRef idx="0">
+        <a:scrgbClr r="0" g="0" b="0"/>
+      </a:effectRef>
+      <a:fontRef idx="minor">
+        <a:schemeClr val="lt1"/>
+      </a:fontRef>
+    </dgm:style>
+  </dgm:styleLbl>
+  <dgm:styleLbl name="vennNode1">
+    <dgm:scene3d>
+      <a:camera prst="orthographicFront"/>
+      <a:lightRig rig="threePt" dir="t"/>
+    </dgm:scene3d>
+    <dgm:sp3d/>
+    <dgm:txPr/>
+    <dgm:style>
+      <a:lnRef idx="2">
+        <a:scrgbClr r="0" g="0" b="0"/>
+      </a:lnRef>
+      <a:fillRef idx="1">
+        <a:scrgbClr r="0" g="0" b="0"/>
+      </a:fillRef>
+      <a:effectRef idx="0">
+        <a:scrgbClr r="0" g="0" b="0"/>
+      </a:effectRef>
+      <a:fontRef idx="minor">
+        <a:schemeClr val="tx1"/>
+      </a:fontRef>
+    </dgm:style>
+  </dgm:styleLbl>
+  <dgm:styleLbl name="alignNode1">
+    <dgm:scene3d>
+      <a:camera prst="orthographicFront"/>
+      <a:lightRig rig="threePt" dir="t"/>
+    </dgm:scene3d>
+    <dgm:sp3d/>
+    <dgm:txPr/>
+    <dgm:style>
+      <a:lnRef idx="2">
+        <a:scrgbClr r="0" g="0" b="0"/>
+      </a:lnRef>
+      <a:fillRef idx="1">
+        <a:scrgbClr r="0" g="0" b="0"/>
+      </a:fillRef>
+      <a:effectRef idx="0">
+        <a:scrgbClr r="0" g="0" b="0"/>
+      </a:effectRef>
+      <a:fontRef idx="minor">
+        <a:schemeClr val="lt1"/>
+      </a:fontRef>
+    </dgm:style>
+  </dgm:styleLbl>
+  <dgm:styleLbl name="node1">
+    <dgm:scene3d>
+      <a:camera prst="orthographicFront"/>
+      <a:lightRig rig="threePt" dir="t"/>
+    </dgm:scene3d>
+    <dgm:sp3d/>
+    <dgm:txPr/>
+    <dgm:style>
+      <a:lnRef idx="2">
+        <a:scrgbClr r="0" g="0" b="0"/>
+      </a:lnRef>
+      <a:fillRef idx="1">
+        <a:scrgbClr r="0" g="0" b="0"/>
+      </a:fillRef>
+      <a:effectRef idx="0">
+        <a:scrgbClr r="0" g="0" b="0"/>
+      </a:effectRef>
+      <a:fontRef idx="minor">
+        <a:schemeClr val="lt1"/>
+      </a:fontRef>
+    </dgm:style>
+  </dgm:styleLbl>
+  <dgm:styleLbl name="node2">
+    <dgm:scene3d>
+      <a:camera prst="orthographicFront"/>
+      <a:lightRig rig="threePt" dir="t"/>
+    </dgm:scene3d>
+    <dgm:sp3d/>
+    <dgm:txPr/>
+    <dgm:style>
+      <a:lnRef idx="2">
+        <a:scrgbClr r="0" g="0" b="0"/>
+      </a:lnRef>
+      <a:fillRef idx="1">
+        <a:scrgbClr r="0" g="0" b="0"/>
+      </a:fillRef>
+      <a:effectRef idx="0">
+        <a:scrgbClr r="0" g="0" b="0"/>
+      </a:effectRef>
+      <a:fontRef idx="minor">
+        <a:schemeClr val="lt1"/>
+      </a:fontRef>
+    </dgm:style>
+  </dgm:styleLbl>
+  <dgm:styleLbl name="node3">
+    <dgm:scene3d>
+      <a:camera prst="orthographicFront"/>
+      <a:lightRig rig="threePt" dir="t"/>
+    </dgm:scene3d>
+    <dgm:sp3d/>
+    <dgm:txPr/>
+    <dgm:style>
+      <a:lnRef idx="2">
+        <a:scrgbClr r="0" g="0" b="0"/>
+      </a:lnRef>
+      <a:fillRef idx="1">
+        <a:scrgbClr r="0" g="0" b="0"/>
+      </a:fillRef>
+      <a:effectRef idx="0">
+        <a:scrgbClr r="0" g="0" b="0"/>
+      </a:effectRef>
+      <a:fontRef idx="minor">
+        <a:schemeClr val="lt1"/>
+      </a:fontRef>
+    </dgm:style>
+  </dgm:styleLbl>
+  <dgm:styleLbl name="node4">
+    <dgm:scene3d>
+      <a:camera prst="orthographicFront"/>
+      <a:lightRig rig="threePt" dir="t"/>
+    </dgm:scene3d>
+    <dgm:sp3d/>
+    <dgm:txPr/>
+    <dgm:style>
+      <a:lnRef idx="2">
+        <a:scrgbClr r="0" g="0" b="0"/>
+      </a:lnRef>
+      <a:fillRef idx="1">
+        <a:scrgbClr r="0" g="0" b="0"/>
+      </a:fillRef>
+      <a:effectRef idx="0">
+        <a:scrgbClr r="0" g="0" b="0"/>
+      </a:effectRef>
+      <a:fontRef idx="minor">
+        <a:schemeClr val="lt1"/>
+      </a:fontRef>
+    </dgm:style>
+  </dgm:styleLbl>
+  <dgm:styleLbl name="fgImgPlace1">
+    <dgm:scene3d>
+      <a:camera prst="orthographicFront"/>
+      <a:lightRig rig="threePt" dir="t"/>
+    </dgm:scene3d>
+    <dgm:sp3d/>
+    <dgm:txPr/>
+    <dgm:style>
+      <a:lnRef idx="2">
+        <a:scrgbClr r="0" g="0" b="0"/>
+      </a:lnRef>
+      <a:fillRef idx="1">
+        <a:scrgbClr r="0" g="0" b="0"/>
+      </a:fillRef>
+      <a:effectRef idx="0">
+        <a:scrgbClr r="0" g="0" b="0"/>
+      </a:effectRef>
+      <a:fontRef idx="minor"/>
+    </dgm:style>
+  </dgm:styleLbl>
+  <dgm:styleLbl name="alignImgPlace1">
+    <dgm:scene3d>
+      <a:camera prst="orthographicFront"/>
+      <a:lightRig rig="threePt" dir="t"/>
+    </dgm:scene3d>
+    <dgm:sp3d/>
+    <dgm:txPr/>
+    <dgm:style>
+      <a:lnRef idx="2">
+        <a:scrgbClr r="0" g="0" b="0"/>
+      </a:lnRef>
+      <a:fillRef idx="1">
+        <a:scrgbClr r="0" g="0" b="0"/>
+      </a:fillRef>
+      <a:effectRef idx="0">
+        <a:scrgbClr r="0" g="0" b="0"/>
+      </a:effectRef>
+      <a:fontRef idx="minor"/>
+    </dgm:style>
+  </dgm:styleLbl>
+  <dgm:styleLbl name="bgImgPlace1">
+    <dgm:scene3d>
+      <a:camera prst="orthographicFront"/>
+      <a:lightRig rig="threePt" dir="t"/>
+    </dgm:scene3d>
+    <dgm:sp3d/>
+    <dgm:txPr/>
+    <dgm:style>
+      <a:lnRef idx="2">
+        <a:scrgbClr r="0" g="0" b="0"/>
+      </a:lnRef>
+      <a:fillRef idx="1">
+        <a:scrgbClr r="0" g="0" b="0"/>
+      </a:fillRef>
+      <a:effectRef idx="0">
+        <a:scrgbClr r="0" g="0" b="0"/>
+      </a:effectRef>
+      <a:fontRef idx="minor"/>
+    </dgm:style>
+  </dgm:styleLbl>
+  <dgm:styleLbl name="sibTrans2D1">
+    <dgm:scene3d>
+      <a:camera prst="orthographicFront"/>
+      <a:lightRig rig="threePt" dir="t"/>
+    </dgm:scene3d>
+    <dgm:sp3d/>
+    <dgm:txPr/>
+    <dgm:style>
+      <a:lnRef idx="0">
+        <a:scrgbClr r="0" g="0" b="0"/>
+      </a:lnRef>
+      <a:fillRef idx="1">
+        <a:scrgbClr r="0" g="0" b="0"/>
+      </a:fillRef>
+      <a:effectRef idx="0">
+        <a:scrgbClr r="0" g="0" b="0"/>
+      </a:effectRef>
+      <a:fontRef idx="minor">
+        <a:schemeClr val="lt1"/>
+      </a:fontRef>
+    </dgm:style>
+  </dgm:styleLbl>
+  <dgm:styleLbl name="fgSibTrans2D1">
+    <dgm:scene3d>
+      <a:camera prst="orthographicFront"/>
+      <a:lightRig rig="threePt" dir="t"/>
+    </dgm:scene3d>
+    <dgm:sp3d/>
+    <dgm:txPr/>
+    <dgm:style>
+      <a:lnRef idx="0">
+        <a:scrgbClr r="0" g="0" b="0"/>
+      </a:lnRef>
+      <a:fillRef idx="1">
+        <a:scrgbClr r="0" g="0" b="0"/>
+      </a:fillRef>
+      <a:effectRef idx="0">
+        <a:scrgbClr r="0" g="0" b="0"/>
+      </a:effectRef>
+      <a:fontRef idx="minor">
+        <a:schemeClr val="lt1"/>
+      </a:fontRef>
+    </dgm:style>
+  </dgm:styleLbl>
+  <dgm:styleLbl name="bgSibTrans2D1">
+    <dgm:scene3d>
+      <a:camera prst="orthographicFront"/>
+      <a:lightRig rig="threePt" dir="t"/>
+    </dgm:scene3d>
+    <dgm:sp3d/>
+    <dgm:txPr/>
+    <dgm:style>
+      <a:lnRef idx="0">
+        <a:scrgbClr r="0" g="0" b="0"/>
+      </a:lnRef>
+      <a:fillRef idx="1">
+        <a:scrgbClr r="0" g="0" b="0"/>
+      </a:fillRef>
+      <a:effectRef idx="0">
+        <a:scrgbClr r="0" g="0" b="0"/>
+      </a:effectRef>
+      <a:fontRef idx="minor">
+        <a:schemeClr val="lt1"/>
+      </a:fontRef>
+    </dgm:style>
+  </dgm:styleLbl>
+  <dgm:styleLbl name="sibTrans1D1">
+    <dgm:scene3d>
+      <a:camera prst="orthographicFront"/>
+      <a:lightRig rig="threePt" dir="t"/>
+    </dgm:scene3d>
+    <dgm:sp3d/>
+    <dgm:txPr/>
+    <dgm:style>
+      <a:lnRef idx="1">
+        <a:scrgbClr r="0" g="0" b="0"/>
+      </a:lnRef>
+      <a:fillRef idx="0">
+        <a:scrgbClr r="0" g="0" b="0"/>
+      </a:fillRef>
+      <a:effectRef idx="0">
+        <a:scrgbClr r="0" g="0" b="0"/>
+      </a:effectRef>
+      <a:fontRef idx="minor"/>
+    </dgm:style>
+  </dgm:styleLbl>
+  <dgm:styleLbl name="callout">
+    <dgm:scene3d>
+      <a:camera prst="orthographicFront"/>
+      <a:lightRig rig="threePt" dir="t"/>
+    </dgm:scene3d>
+    <dgm:sp3d/>
+    <dgm:txPr/>
+    <dgm:style>
+      <a:lnRef idx="2">
+        <a:scrgbClr r="0" g="0" b="0"/>
+      </a:lnRef>
+      <a:fillRef idx="1">
+        <a:scrgbClr r="0" g="0" b="0"/>
+      </a:fillRef>
+      <a:effectRef idx="0">
+        <a:scrgbClr r="0" g="0" b="0"/>
+      </a:effectRef>
+      <a:fontRef idx="minor"/>
+    </dgm:style>
+  </dgm:styleLbl>
+  <dgm:styleLbl name="asst0">
+    <dgm:scene3d>
+      <a:camera prst="orthographicFront"/>
+      <a:lightRig rig="threePt" dir="t"/>
+    </dgm:scene3d>
+    <dgm:sp3d/>
+    <dgm:txPr/>
+    <dgm:style>
+      <a:lnRef idx="2">
+        <a:scrgbClr r="0" g="0" b="0"/>
+      </a:lnRef>
+      <a:fillRef idx="1">
+        <a:scrgbClr r="0" g="0" b="0"/>
+      </a:fillRef>
+      <a:effectRef idx="0">
+        <a:scrgbClr r="0" g="0" b="0"/>
+      </a:effectRef>
+      <a:fontRef idx="minor">
+        <a:schemeClr val="lt1"/>
+      </a:fontRef>
+    </dgm:style>
+  </dgm:styleLbl>
+  <dgm:styleLbl name="asst1">
+    <dgm:scene3d>
+      <a:camera prst="orthographicFront"/>
+      <a:lightRig rig="threePt" dir="t"/>
+    </dgm:scene3d>
+    <dgm:sp3d/>
+    <dgm:txPr/>
+    <dgm:style>
+      <a:lnRef idx="2">
+        <a:scrgbClr r="0" g="0" b="0"/>
+      </a:lnRef>
+      <a:fillRef idx="1">
+        <a:scrgbClr r="0" g="0" b="0"/>
+      </a:fillRef>
+      <a:effectRef idx="0">
+        <a:scrgbClr r="0" g="0" b="0"/>
+      </a:effectRef>
+      <a:fontRef idx="minor">
+        <a:schemeClr val="lt1"/>
+      </a:fontRef>
+    </dgm:style>
+  </dgm:styleLbl>
+  <dgm:styleLbl name="asst2">
+    <dgm:scene3d>
+      <a:camera prst="orthographicFront"/>
+      <a:lightRig rig="threePt" dir="t"/>
+    </dgm:scene3d>
+    <dgm:sp3d/>
+    <dgm:txPr/>
+    <dgm:style>
+      <a:lnRef idx="2">
+        <a:scrgbClr r="0" g="0" b="0"/>
+      </a:lnRef>
+      <a:fillRef idx="1">
+        <a:scrgbClr r="0" g="0" b="0"/>
+      </a:fillRef>
+      <a:effectRef idx="0">
+        <a:scrgbClr r="0" g="0" b="0"/>
+      </a:effectRef>
+      <a:fontRef idx="minor">
+        <a:schemeClr val="lt1"/>
+      </a:fontRef>
+    </dgm:style>
+  </dgm:styleLbl>
+  <dgm:styleLbl name="asst3">
+    <dgm:scene3d>
+      <a:camera prst="orthographicFront"/>
+      <a:lightRig rig="threePt" dir="t"/>
+    </dgm:scene3d>
+    <dgm:sp3d/>
+    <dgm:txPr/>
+    <dgm:style>
+      <a:lnRef idx="2">
+        <a:scrgbClr r="0" g="0" b="0"/>
+      </a:lnRef>
+      <a:fillRef idx="1">
+        <a:scrgbClr r="0" g="0" b="0"/>
+      </a:fillRef>
+      <a:effectRef idx="0">
+        <a:scrgbClr r="0" g="0" b="0"/>
+      </a:effectRef>
+      <a:fontRef idx="minor">
+        <a:schemeClr val="lt1"/>
+      </a:fontRef>
+    </dgm:style>
+  </dgm:styleLbl>
+  <dgm:styleLbl name="asst4">
+    <dgm:scene3d>
+      <a:camera prst="orthographicFront"/>
+      <a:lightRig rig="threePt" dir="t"/>
+    </dgm:scene3d>
+    <dgm:sp3d/>
+    <dgm:txPr/>
+    <dgm:style>
+      <a:lnRef idx="2">
+        <a:scrgbClr r="0" g="0" b="0"/>
+      </a:lnRef>
+      <a:fillRef idx="1">
+        <a:scrgbClr r="0" g="0" b="0"/>
+      </a:fillRef>
+      <a:effectRef idx="0">
+        <a:scrgbClr r="0" g="0" b="0"/>
+      </a:effectRef>
+      <a:fontRef idx="minor">
+        <a:schemeClr val="lt1"/>
+      </a:fontRef>
+    </dgm:style>
+  </dgm:styleLbl>
+  <dgm:styleLbl name="parChTrans2D1">
+    <dgm:scene3d>
+      <a:camera prst="orthographicFront"/>
+      <a:lightRig rig="threePt" dir="t"/>
+    </dgm:scene3d>
+    <dgm:sp3d/>
+    <dgm:txPr/>
+    <dgm:style>
+      <a:lnRef idx="2">
+        <a:scrgbClr r="0" g="0" b="0"/>
+      </a:lnRef>
+      <a:fillRef idx="1">
+        <a:scrgbClr r="0" g="0" b="0"/>
+      </a:fillRef>
+      <a:effectRef idx="0">
+        <a:scrgbClr r="0" g="0" b="0"/>
+      </a:effectRef>
+      <a:fontRef idx="minor">
+        <a:schemeClr val="lt1"/>
+      </a:fontRef>
+    </dgm:style>
+  </dgm:styleLbl>
+  <dgm:styleLbl name="parChTrans2D2">
+    <dgm:scene3d>
+      <a:camera prst="orthographicFront"/>
+      <a:lightRig rig="threePt" dir="t"/>
+    </dgm:scene3d>
+    <dgm:sp3d/>
+    <dgm:txPr/>
+    <dgm:style>
+      <a:lnRef idx="2">
+        <a:scrgbClr r="0" g="0" b="0"/>
+      </a:lnRef>
+      <a:fillRef idx="1">
+        <a:scrgbClr r="0" g="0" b="0"/>
+      </a:fillRef>
+      <a:effectRef idx="0">
+        <a:scrgbClr r="0" g="0" b="0"/>
+      </a:effectRef>
+      <a:fontRef idx="minor">
+        <a:schemeClr val="lt1"/>
+      </a:fontRef>
+    </dgm:style>
+  </dgm:styleLbl>
+  <dgm:styleLbl name="parChTrans2D3">
+    <dgm:scene3d>
+      <a:camera prst="orthographicFront"/>
+      <a:lightRig rig="threePt" dir="t"/>
+    </dgm:scene3d>
+    <dgm:sp3d/>
+    <dgm:txPr/>
+    <dgm:style>
+      <a:lnRef idx="2">
+        <a:scrgbClr r="0" g="0" b="0"/>
+      </a:lnRef>
+      <a:fillRef idx="1">
+        <a:scrgbClr r="0" g="0" b="0"/>
+      </a:fillRef>
+      <a:effectRef idx="0">
+        <a:scrgbClr r="0" g="0" b="0"/>
+      </a:effectRef>
+      <a:fontRef idx="minor">
+        <a:schemeClr val="lt1"/>
+      </a:fontRef>
+    </dgm:style>
+  </dgm:styleLbl>
+  <dgm:styleLbl name="parChTrans2D4">
+    <dgm:scene3d>
+      <a:camera prst="orthographicFront"/>
+      <a:lightRig rig="threePt" dir="t"/>
+    </dgm:scene3d>
+    <dgm:sp3d/>
+    <dgm:txPr/>
+    <dgm:style>
+      <a:lnRef idx="2">
+        <a:scrgbClr r="0" g="0" b="0"/>
+      </a:lnRef>
+      <a:fillRef idx="1">
+        <a:scrgbClr r="0" g="0" b="0"/>
+      </a:fillRef>
+      <a:effectRef idx="0">
+        <a:scrgbClr r="0" g="0" b="0"/>
+      </a:effectRef>
+      <a:fontRef idx="minor">
+        <a:schemeClr val="lt1"/>
+      </a:fontRef>
+    </dgm:style>
+  </dgm:styleLbl>
+  <dgm:styleLbl name="parChTrans1D1">
+    <dgm:scene3d>
+      <a:camera prst="orthographicFront"/>
+      <a:lightRig rig="threePt" dir="t"/>
+    </dgm:scene3d>
+    <dgm:sp3d/>
+    <dgm:txPr/>
+    <dgm:style>
+      <a:lnRef idx="2">
+        <a:scrgbClr r="0" g="0" b="0"/>
+      </a:lnRef>
+      <a:fillRef idx="0">
+        <a:scrgbClr r="0" g="0" b="0"/>
+      </a:fillRef>
+      <a:effectRef idx="0">
+        <a:scrgbClr r="0" g="0" b="0"/>
+      </a:effectRef>
+      <a:fontRef idx="minor"/>
+    </dgm:style>
+  </dgm:styleLbl>
+  <dgm:styleLbl name="parChTrans1D2">
+    <dgm:scene3d>
+      <a:camera prst="orthographicFront"/>
+      <a:lightRig rig="threePt" dir="t"/>
+    </dgm:scene3d>
+    <dgm:sp3d/>
+    <dgm:txPr/>
+    <dgm:style>
+      <a:lnRef idx="2">
+        <a:scrgbClr r="0" g="0" b="0"/>
+      </a:lnRef>
+      <a:fillRef idx="0">
+        <a:scrgbClr r="0" g="0" b="0"/>
+      </a:fillRef>
+      <a:effectRef idx="0">
+        <a:scrgbClr r="0" g="0" b="0"/>
+      </a:effectRef>
+      <a:fontRef idx="minor"/>
+    </dgm:style>
+  </dgm:styleLbl>
+  <dgm:styleLbl name="parChTrans1D3">
+    <dgm:scene3d>
+      <a:camera prst="orthographicFront"/>
+      <a:lightRig rig="threePt" dir="t"/>
+    </dgm:scene3d>
+    <dgm:sp3d/>
+    <dgm:txPr/>
+    <dgm:style>
+      <a:lnRef idx="2">
+        <a:scrgbClr r="0" g="0" b="0"/>
+      </a:lnRef>
+      <a:fillRef idx="0">
+        <a:scrgbClr r="0" g="0" b="0"/>
+      </a:fillRef>
+      <a:effectRef idx="0">
+        <a:scrgbClr r="0" g="0" b="0"/>
+      </a:effectRef>
+      <a:fontRef idx="minor"/>
+    </dgm:style>
+  </dgm:styleLbl>
+  <dgm:styleLbl name="parChTrans1D4">
+    <dgm:scene3d>
+      <a:camera prst="orthographicFront"/>
+      <a:lightRig rig="threePt" dir="t"/>
+    </dgm:scene3d>
+    <dgm:sp3d/>
+    <dgm:txPr/>
+    <dgm:style>
+      <a:lnRef idx="2">
+        <a:scrgbClr r="0" g="0" b="0"/>
+      </a:lnRef>
+      <a:fillRef idx="0">
+        <a:scrgbClr r="0" g="0" b="0"/>
+      </a:fillRef>
+      <a:effectRef idx="0">
+        <a:scrgbClr r="0" g="0" b="0"/>
+      </a:effectRef>
+      <a:fontRef idx="minor"/>
+    </dgm:style>
+  </dgm:styleLbl>
+  <dgm:styleLbl name="fgAcc1">
+    <dgm:scene3d>
+      <a:camera prst="orthographicFront"/>
+      <a:lightRig rig="threePt" dir="t"/>
+    </dgm:scene3d>
+    <dgm:sp3d/>
+    <dgm:txPr/>
+    <dgm:style>
+      <a:lnRef idx="2">
+        <a:scrgbClr r="0" g="0" b="0"/>
+      </a:lnRef>
+      <a:fillRef idx="1">
+        <a:scrgbClr r="0" g="0" b="0"/>
+      </a:fillRef>
+      <a:effectRef idx="0">
+        <a:scrgbClr r="0" g="0" b="0"/>
+      </a:effectRef>
+      <a:fontRef idx="minor"/>
+    </dgm:style>
+  </dgm:styleLbl>
+  <dgm:styleLbl name="conFgAcc1">
+    <dgm:scene3d>
+      <a:camera prst="orthographicFront"/>
+      <a:lightRig rig="threePt" dir="t"/>
+    </dgm:scene3d>
+    <dgm:sp3d/>
+    <dgm:txPr/>
+    <dgm:style>
+      <a:lnRef idx="2">
+        <a:scrgbClr r="0" g="0" b="0"/>
+      </a:lnRef>
+      <a:fillRef idx="1">
+        <a:scrgbClr r="0" g="0" b="0"/>
+      </a:fillRef>
+      <a:effectRef idx="0">
+        <a:scrgbClr r="0" g="0" b="0"/>
+      </a:effectRef>
+      <a:fontRef idx="minor"/>
+    </dgm:style>
+  </dgm:styleLbl>
+  <dgm:styleLbl name="alignAcc1">
+    <dgm:scene3d>
+      <a:camera prst="orthographicFront"/>
+      <a:lightRig rig="threePt" dir="t"/>
+    </dgm:scene3d>
+    <dgm:sp3d/>
+    <dgm:txPr/>
+    <dgm:style>
+      <a:lnRef idx="2">
+        <a:scrgbClr r="0" g="0" b="0"/>
+      </a:lnRef>
+      <a:fillRef idx="1">
+        <a:scrgbClr r="0" g="0" b="0"/>
+      </a:fillRef>
+      <a:effectRef idx="0">
+        <a:scrgbClr r="0" g="0" b="0"/>
+      </a:effectRef>
+      <a:fontRef idx="minor"/>
+    </dgm:style>
+  </dgm:styleLbl>
+  <dgm:styleLbl name="trAlignAcc1">
+    <dgm:scene3d>
+      <a:camera prst="orthographicFront"/>
+      <a:lightRig rig="threePt" dir="t"/>
+    </dgm:scene3d>
+    <dgm:sp3d/>
+    <dgm:txPr/>
+    <dgm:style>
+      <a:lnRef idx="1">
+        <a:scrgbClr r="0" g="0" b="0"/>
+      </a:lnRef>
+      <a:fillRef idx="1">
+        <a:scrgbClr r="0" g="0" b="0"/>
+      </a:fillRef>
+      <a:effectRef idx="0">
+        <a:scrgbClr r="0" g="0" b="0"/>
+      </a:effectRef>
+      <a:fontRef idx="minor"/>
+    </dgm:style>
+  </dgm:styleLbl>
+  <dgm:styleLbl name="bgAcc1">
+    <dgm:scene3d>
+      <a:camera prst="orthographicFront"/>
+      <a:lightRig rig="threePt" dir="t"/>
+    </dgm:scene3d>
+    <dgm:sp3d/>
+    <dgm:txPr/>
+    <dgm:style>
+      <a:lnRef idx="2">
+        <a:scrgbClr r="0" g="0" b="0"/>
+      </a:lnRef>
+      <a:fillRef idx="1">
+        <a:scrgbClr r="0" g="0" b="0"/>
+      </a:fillRef>
+      <a:effectRef idx="0">
+        <a:scrgbClr r="0" g="0" b="0"/>
+      </a:effectRef>
+      <a:fontRef idx="minor"/>
+    </dgm:style>
+  </dgm:styleLbl>
+  <dgm:styleLbl name="solidFgAcc1">
+    <dgm:scene3d>
+      <a:camera prst="orthographicFront"/>
+      <a:lightRig rig="threePt" dir="t"/>
+    </dgm:scene3d>
+    <dgm:sp3d/>
+    <dgm:txPr/>
+    <dgm:style>
+      <a:lnRef idx="2">
+        <a:scrgbClr r="0" g="0" b="0"/>
+      </a:lnRef>
+      <a:fillRef idx="1">
+        <a:scrgbClr r="0" g="0" b="0"/>
+      </a:fillRef>
+      <a:effectRef idx="0">
+        <a:scrgbClr r="0" g="0" b="0"/>
+      </a:effectRef>
+      <a:fontRef idx="minor"/>
+    </dgm:style>
+  </dgm:styleLbl>
+  <dgm:styleLbl name="solidAlignAcc1">
+    <dgm:scene3d>
+      <a:camera prst="orthographicFront"/>
+      <a:lightRig rig="threePt" dir="t"/>
+    </dgm:scene3d>
+    <dgm:sp3d/>
+    <dgm:txPr/>
+    <dgm:style>
+      <a:lnRef idx="2">
+        <a:scrgbClr r="0" g="0" b="0"/>
+      </a:lnRef>
+      <a:fillRef idx="1">
+        <a:scrgbClr r="0" g="0" b="0"/>
+      </a:fillRef>
+      <a:effectRef idx="0">
+        <a:scrgbClr r="0" g="0" b="0"/>
+      </a:effectRef>
+      <a:fontRef idx="minor"/>
+    </dgm:style>
+  </dgm:styleLbl>
+  <dgm:styleLbl name="solidBgAcc1">
+    <dgm:scene3d>
+      <a:camera prst="orthographicFront"/>
+      <a:lightRig rig="threePt" dir="t"/>
+    </dgm:scene3d>
+    <dgm:sp3d/>
+    <dgm:txPr/>
+    <dgm:style>
+      <a:lnRef idx="2">
+        <a:scrgbClr r="0" g="0" b="0"/>
+      </a:lnRef>
+      <a:fillRef idx="1">
+        <a:scrgbClr r="0" g="0" b="0"/>
+      </a:fillRef>
+      <a:effectRef idx="0">
+        <a:scrgbClr r="0" g="0" b="0"/>
+      </a:effectRef>
+      <a:fontRef idx="minor"/>
+    </dgm:style>
+  </dgm:styleLbl>
+  <dgm:styleLbl name="fgAccFollowNode1">
+    <dgm:scene3d>
+      <a:camera prst="orthographicFront"/>
+      <a:lightRig rig="threePt" dir="t"/>
+    </dgm:scene3d>
+    <dgm:sp3d/>
+    <dgm:txPr/>
+    <dgm:style>
+      <a:lnRef idx="2">
+        <a:scrgbClr r="0" g="0" b="0"/>
+      </a:lnRef>
+      <a:fillRef idx="1">
+        <a:scrgbClr r="0" g="0" b="0"/>
+      </a:fillRef>
+      <a:effectRef idx="0">
+        <a:scrgbClr r="0" g="0" b="0"/>
+      </a:effectRef>
+      <a:fontRef idx="minor"/>
+    </dgm:style>
+  </dgm:styleLbl>
+  <dgm:styleLbl name="alignAccFollowNode1">
+    <dgm:scene3d>
+      <a:camera prst="orthographicFront"/>
+      <a:lightRig rig="threePt" dir="t"/>
+    </dgm:scene3d>
+    <dgm:sp3d/>
+    <dgm:txPr/>
+    <dgm:style>
+      <a:lnRef idx="2">
+        <a:scrgbClr r="0" g="0" b="0"/>
+      </a:lnRef>
+      <a:fillRef idx="1">
+        <a:scrgbClr r="0" g="0" b="0"/>
+      </a:fillRef>
+      <a:effectRef idx="0">
+        <a:scrgbClr r="0" g="0" b="0"/>
+      </a:effectRef>
+      <a:fontRef idx="minor"/>
+    </dgm:style>
+  </dgm:styleLbl>
+  <dgm:styleLbl name="bgAccFollowNode1">
+    <dgm:scene3d>
+      <a:camera prst="orthographicFront"/>
+      <a:lightRig rig="threePt" dir="t"/>
+    </dgm:scene3d>
+    <dgm:sp3d/>
+    <dgm:txPr/>
+    <dgm:style>
+      <a:lnRef idx="2">
+        <a:scrgbClr r="0" g="0" b="0"/>
+      </a:lnRef>
+      <a:fillRef idx="1">
+        <a:scrgbClr r="0" g="0" b="0"/>
+      </a:fillRef>
+      <a:effectRef idx="0">
+        <a:scrgbClr r="0" g="0" b="0"/>
+      </a:effectRef>
+      <a:fontRef idx="minor"/>
+    </dgm:style>
+  </dgm:styleLbl>
+  <dgm:styleLbl name="fgAcc0">
+    <dgm:scene3d>
+      <a:camera prst="orthographicFront"/>
+      <a:lightRig rig="threePt" dir="t"/>
+    </dgm:scene3d>
+    <dgm:sp3d/>
+    <dgm:txPr/>
+    <dgm:style>
+      <a:lnRef idx="2">
+        <a:scrgbClr r="0" g="0" b="0"/>
+      </a:lnRef>
+      <a:fillRef idx="1">
+        <a:scrgbClr r="0" g="0" b="0"/>
+      </a:fillRef>
+      <a:effectRef idx="0">
+        <a:scrgbClr r="0" g="0" b="0"/>
+      </a:effectRef>
+      <a:fontRef idx="minor"/>
+    </dgm:style>
+  </dgm:styleLbl>
+  <dgm:styleLbl name="fgAcc2">
+    <dgm:scene3d>
+      <a:camera prst="orthographicFront"/>
+      <a:lightRig rig="threePt" dir="t"/>
+    </dgm:scene3d>
+    <dgm:sp3d/>
+    <dgm:txPr/>
+    <dgm:style>
+      <a:lnRef idx="2">
+        <a:scrgbClr r="0" g="0" b="0"/>
+      </a:lnRef>
+      <a:fillRef idx="1">
+        <a:scrgbClr r="0" g="0" b="0"/>
+      </a:fillRef>
+      <a:effectRef idx="0">
+        <a:scrgbClr r="0" g="0" b="0"/>
+      </a:effectRef>
+      <a:fontRef idx="minor"/>
+    </dgm:style>
+  </dgm:styleLbl>
+  <dgm:styleLbl name="fgAcc3">
+    <dgm:scene3d>
+      <a:camera prst="orthographicFront"/>
+      <a:lightRig rig="threePt" dir="t"/>
+    </dgm:scene3d>
+    <dgm:sp3d/>
+    <dgm:txPr/>
+    <dgm:style>
+      <a:lnRef idx="2">
+        <a:scrgbClr r="0" g="0" b="0"/>
+      </a:lnRef>
+      <a:fillRef idx="1">
+        <a:scrgbClr r="0" g="0" b="0"/>
+      </a:fillRef>
+      <a:effectRef idx="0">
+        <a:scrgbClr r="0" g="0" b="0"/>
+      </a:effectRef>
+      <a:fontRef idx="minor"/>
+    </dgm:style>
+  </dgm:styleLbl>
+  <dgm:styleLbl name="fgAcc4">
+    <dgm:scene3d>
+      <a:camera prst="orthographicFront"/>
+      <a:lightRig rig="threePt" dir="t"/>
+    </dgm:scene3d>
+    <dgm:sp3d/>
+    <dgm:txPr/>
+    <dgm:style>
+      <a:lnRef idx="2">
+        <a:scrgbClr r="0" g="0" b="0"/>
+      </a:lnRef>
+      <a:fillRef idx="1">
+        <a:scrgbClr r="0" g="0" b="0"/>
+      </a:fillRef>
+      <a:effectRef idx="0">
+        <a:scrgbClr r="0" g="0" b="0"/>
+      </a:effectRef>
+      <a:fontRef idx="minor"/>
+    </dgm:style>
+  </dgm:styleLbl>
+  <dgm:styleLbl name="bgShp">
+    <dgm:scene3d>
+      <a:camera prst="orthographicFront"/>
+      <a:lightRig rig="threePt" dir="t"/>
+    </dgm:scene3d>
+    <dgm:sp3d/>
+    <dgm:txPr/>
+    <dgm:style>
+      <a:lnRef idx="0">
+        <a:scrgbClr r="0" g="0" b="0"/>
+      </a:lnRef>
+      <a:fillRef idx="1">
+        <a:scrgbClr r="0" g="0" b="0"/>
+      </a:fillRef>
+      <a:effectRef idx="0">
+        <a:scrgbClr r="0" g="0" b="0"/>
+      </a:effectRef>
+      <a:fontRef idx="minor"/>
+    </dgm:style>
+  </dgm:styleLbl>
+  <dgm:styleLbl name="dkBgShp">
+    <dgm:scene3d>
+      <a:camera prst="orthographicFront"/>
+      <a:lightRig rig="threePt" dir="t"/>
+    </dgm:scene3d>
+    <dgm:sp3d/>
+    <dgm:txPr/>
+    <dgm:style>
+      <a:lnRef idx="0">
+        <a:scrgbClr r="0" g="0" b="0"/>
+      </a:lnRef>
+      <a:fillRef idx="1">
+        <a:scrgbClr r="0" g="0" b="0"/>
+      </a:fillRef>
+      <a:effectRef idx="0">
+        <a:scrgbClr r="0" g="0" b="0"/>
+      </a:effectRef>
+      <a:fontRef idx="minor"/>
+    </dgm:style>
+  </dgm:styleLbl>
+  <dgm:styleLbl name="trBgShp">
+    <dgm:scene3d>
+      <a:camera prst="orthographicFront"/>
+      <a:lightRig rig="threePt" dir="t"/>
+    </dgm:scene3d>
+    <dgm:sp3d/>
+    <dgm:txPr/>
+    <dgm:style>
+      <a:lnRef idx="0">
+        <a:scrgbClr r="0" g="0" b="0"/>
+      </a:lnRef>
+      <a:fillRef idx="1">
+        <a:scrgbClr r="0" g="0" b="0"/>
+      </a:fillRef>
+      <a:effectRef idx="0">
+        <a:scrgbClr r="0" g="0" b="0"/>
+      </a:effectRef>
+      <a:fontRef idx="minor"/>
+    </dgm:style>
+  </dgm:styleLbl>
+  <dgm:styleLbl name="fgShp">
+    <dgm:scene3d>
+      <a:camera prst="orthographicFront"/>
+      <a:lightRig rig="threePt" dir="t"/>
+    </dgm:scene3d>
+    <dgm:sp3d/>
+    <dgm:txPr/>
+    <dgm:style>
+      <a:lnRef idx="2">
+        <a:scrgbClr r="0" g="0" b="0"/>
+      </a:lnRef>
+      <a:fillRef idx="1">
+        <a:scrgbClr r="0" g="0" b="0"/>
+      </a:fillRef>
+      <a:effectRef idx="0">
+        <a:scrgbClr r="0" g="0" b="0"/>
+      </a:effectRef>
+      <a:fontRef idx="minor"/>
+    </dgm:style>
+  </dgm:styleLbl>
+  <dgm:styleLbl name="revTx">
+    <dgm:scene3d>
+      <a:camera prst="orthographicFront"/>
+      <a:lightRig rig="threePt" dir="t"/>
+    </dgm:scene3d>
+    <dgm:sp3d/>
+    <dgm:txPr/>
+    <dgm:style>
+      <a:lnRef idx="0">
+        <a:scrgbClr r="0" g="0" b="0"/>
+      </a:lnRef>
+      <a:fillRef idx="0">
+        <a:scrgbClr r="0" g="0" b="0"/>
+      </a:fillRef>
+      <a:effectRef idx="0">
+        <a:scrgbClr r="0" g="0" b="0"/>
+      </a:effectRef>
+      <a:fontRef idx="minor"/>
+    </dgm:style>
+  </dgm:styleLbl>
+</dgm:styleDef>
+</file>
+
 <file path=ppt/notesMasters/notesMaster1.xml><?xml version="1.0" encoding="utf-8"?>
 <p:notesMaster xmlns:a="http://schemas.openxmlformats.org/drawingml/2006/main" xmlns:r="http://schemas.openxmlformats.org/officeDocument/2006/relationships" xmlns:p="http://schemas.openxmlformats.org/presentationml/2006/main">
   <p:cSld>
@@ -1226,7 +3968,7 @@
           <a:p>
             <a:fld id="{D127C662-DAED-5F4C-924F-3E57DE49EA3F}" type="datetimeFigureOut">
               <a:rPr lang="en-US" smtClean="0"/>
-              <a:t>9/28/18</a:t>
+              <a:t>9/29/18</a:t>
             </a:fld>
             <a:endParaRPr lang="en-US"/>
           </a:p>
@@ -2095,7 +4837,7 @@
           <a:p>
             <a:fld id="{F6A9BCBF-ECF4-7945-89BD-3D5F6D76FF31}" type="datetimeFigureOut">
               <a:rPr lang="en-US" smtClean="0"/>
-              <a:t>9/28/18</a:t>
+              <a:t>9/29/18</a:t>
             </a:fld>
             <a:endParaRPr lang="en-US"/>
           </a:p>
@@ -2293,7 +5035,7 @@
           <a:p>
             <a:fld id="{F6A9BCBF-ECF4-7945-89BD-3D5F6D76FF31}" type="datetimeFigureOut">
               <a:rPr lang="en-US" smtClean="0"/>
-              <a:t>9/28/18</a:t>
+              <a:t>9/29/18</a:t>
             </a:fld>
             <a:endParaRPr lang="en-US"/>
           </a:p>
@@ -2501,7 +5243,7 @@
           <a:p>
             <a:fld id="{F6A9BCBF-ECF4-7945-89BD-3D5F6D76FF31}" type="datetimeFigureOut">
               <a:rPr lang="en-US" smtClean="0"/>
-              <a:t>9/28/18</a:t>
+              <a:t>9/29/18</a:t>
             </a:fld>
             <a:endParaRPr lang="en-US"/>
           </a:p>
@@ -2699,7 +5441,7 @@
           <a:p>
             <a:fld id="{F6A9BCBF-ECF4-7945-89BD-3D5F6D76FF31}" type="datetimeFigureOut">
               <a:rPr lang="en-US" smtClean="0"/>
-              <a:t>9/28/18</a:t>
+              <a:t>9/29/18</a:t>
             </a:fld>
             <a:endParaRPr lang="en-US"/>
           </a:p>
@@ -2974,7 +5716,7 @@
           <a:p>
             <a:fld id="{F6A9BCBF-ECF4-7945-89BD-3D5F6D76FF31}" type="datetimeFigureOut">
               <a:rPr lang="en-US" smtClean="0"/>
-              <a:t>9/28/18</a:t>
+              <a:t>9/29/18</a:t>
             </a:fld>
             <a:endParaRPr lang="en-US"/>
           </a:p>
@@ -3239,7 +5981,7 @@
           <a:p>
             <a:fld id="{F6A9BCBF-ECF4-7945-89BD-3D5F6D76FF31}" type="datetimeFigureOut">
               <a:rPr lang="en-US" smtClean="0"/>
-              <a:t>9/28/18</a:t>
+              <a:t>9/29/18</a:t>
             </a:fld>
             <a:endParaRPr lang="en-US"/>
           </a:p>
@@ -3651,7 +6393,7 @@
           <a:p>
             <a:fld id="{F6A9BCBF-ECF4-7945-89BD-3D5F6D76FF31}" type="datetimeFigureOut">
               <a:rPr lang="en-US" smtClean="0"/>
-              <a:t>9/28/18</a:t>
+              <a:t>9/29/18</a:t>
             </a:fld>
             <a:endParaRPr lang="en-US"/>
           </a:p>
@@ -3792,7 +6534,7 @@
           <a:p>
             <a:fld id="{F6A9BCBF-ECF4-7945-89BD-3D5F6D76FF31}" type="datetimeFigureOut">
               <a:rPr lang="en-US" smtClean="0"/>
-              <a:t>9/28/18</a:t>
+              <a:t>9/29/18</a:t>
             </a:fld>
             <a:endParaRPr lang="en-US"/>
           </a:p>
@@ -3905,7 +6647,7 @@
           <a:p>
             <a:fld id="{F6A9BCBF-ECF4-7945-89BD-3D5F6D76FF31}" type="datetimeFigureOut">
               <a:rPr lang="en-US" smtClean="0"/>
-              <a:t>9/28/18</a:t>
+              <a:t>9/29/18</a:t>
             </a:fld>
             <a:endParaRPr lang="en-US"/>
           </a:p>
@@ -4216,7 +6958,7 @@
           <a:p>
             <a:fld id="{F6A9BCBF-ECF4-7945-89BD-3D5F6D76FF31}" type="datetimeFigureOut">
               <a:rPr lang="en-US" smtClean="0"/>
-              <a:t>9/28/18</a:t>
+              <a:t>9/29/18</a:t>
             </a:fld>
             <a:endParaRPr lang="en-US"/>
           </a:p>
@@ -4504,7 +7246,7 @@
           <a:p>
             <a:fld id="{F6A9BCBF-ECF4-7945-89BD-3D5F6D76FF31}" type="datetimeFigureOut">
               <a:rPr lang="en-US" smtClean="0"/>
-              <a:t>9/28/18</a:t>
+              <a:t>9/29/18</a:t>
             </a:fld>
             <a:endParaRPr lang="en-US"/>
           </a:p>
@@ -4745,7 +7487,7 @@
           <a:p>
             <a:fld id="{F6A9BCBF-ECF4-7945-89BD-3D5F6D76FF31}" type="datetimeFigureOut">
               <a:rPr lang="en-US" smtClean="0"/>
-              <a:t>9/28/18</a:t>
+              <a:t>9/29/18</a:t>
             </a:fld>
             <a:endParaRPr lang="en-US"/>
           </a:p>
@@ -9001,6 +11743,887 @@
     <p:extLst>
       <p:ext uri="{BB962C8B-B14F-4D97-AF65-F5344CB8AC3E}">
         <p14:creationId xmlns:p14="http://schemas.microsoft.com/office/powerpoint/2010/main" val="1313696898"/>
+      </p:ext>
+    </p:extLst>
+  </p:cSld>
+  <p:clrMapOvr>
+    <a:masterClrMapping/>
+  </p:clrMapOvr>
+</p:sld>
+</file>
+
+<file path=ppt/slides/slide6.xml><?xml version="1.0" encoding="utf-8"?>
+<p:sld xmlns:a="http://schemas.openxmlformats.org/drawingml/2006/main" xmlns:r="http://schemas.openxmlformats.org/officeDocument/2006/relationships" xmlns:p="http://schemas.openxmlformats.org/presentationml/2006/main">
+  <p:cSld>
+    <p:spTree>
+      <p:nvGrpSpPr>
+        <p:cNvPr id="1" name=""/>
+        <p:cNvGrpSpPr/>
+        <p:nvPr/>
+      </p:nvGrpSpPr>
+      <p:grpSpPr>
+        <a:xfrm>
+          <a:off x="0" y="0"/>
+          <a:ext cx="0" cy="0"/>
+          <a:chOff x="0" y="0"/>
+          <a:chExt cx="0" cy="0"/>
+        </a:xfrm>
+      </p:grpSpPr>
+      <p:sp>
+        <p:nvSpPr>
+          <p:cNvPr id="2" name="Title 1">
+            <a:extLst>
+              <a:ext uri="{FF2B5EF4-FFF2-40B4-BE49-F238E27FC236}">
+                <a16:creationId xmlns:a16="http://schemas.microsoft.com/office/drawing/2014/main" id="{B0529C14-F556-C54E-BF9D-B48EF1BEE6DE}"/>
+              </a:ext>
+            </a:extLst>
+          </p:cNvPr>
+          <p:cNvSpPr>
+            <a:spLocks noGrp="1"/>
+          </p:cNvSpPr>
+          <p:nvPr>
+            <p:ph type="title"/>
+          </p:nvPr>
+        </p:nvSpPr>
+        <p:spPr/>
+        <p:txBody>
+          <a:bodyPr/>
+          <a:lstStyle/>
+          <a:p>
+            <a:r>
+              <a:rPr lang="en-US" dirty="0"/>
+              <a:t>Required files</a:t>
+            </a:r>
+          </a:p>
+        </p:txBody>
+      </p:sp>
+      <p:sp>
+        <p:nvSpPr>
+          <p:cNvPr id="3" name="Content Placeholder 2">
+            <a:extLst>
+              <a:ext uri="{FF2B5EF4-FFF2-40B4-BE49-F238E27FC236}">
+                <a16:creationId xmlns:a16="http://schemas.microsoft.com/office/drawing/2014/main" id="{68B27689-B8E2-6F49-96CC-C3F15CFEF8A6}"/>
+              </a:ext>
+            </a:extLst>
+          </p:cNvPr>
+          <p:cNvSpPr>
+            <a:spLocks noGrp="1"/>
+          </p:cNvSpPr>
+          <p:nvPr>
+            <p:ph idx="1"/>
+          </p:nvPr>
+        </p:nvSpPr>
+        <p:spPr/>
+        <p:txBody>
+          <a:bodyPr>
+            <a:normAutofit fontScale="85000" lnSpcReduction="20000"/>
+          </a:bodyPr>
+          <a:lstStyle/>
+          <a:p>
+            <a:r>
+              <a:rPr lang="en-US" dirty="0" err="1"/>
+              <a:t>App.py</a:t>
+            </a:r>
+            <a:r>
+              <a:rPr lang="en-US" dirty="0"/>
+              <a:t> </a:t>
+            </a:r>
+          </a:p>
+          <a:p>
+            <a:r>
+              <a:rPr lang="en-US" dirty="0" err="1"/>
+              <a:t>App.js</a:t>
+            </a:r>
+            <a:endParaRPr lang="en-US" dirty="0"/>
+          </a:p>
+          <a:p>
+            <a:pPr lvl="1"/>
+            <a:r>
+              <a:rPr lang="en-US" dirty="0"/>
+              <a:t>Viz 1 – map</a:t>
+            </a:r>
+          </a:p>
+          <a:p>
+            <a:pPr lvl="1"/>
+            <a:r>
+              <a:rPr lang="en-US" dirty="0"/>
+              <a:t>Viz 2 – chart</a:t>
+            </a:r>
+          </a:p>
+          <a:p>
+            <a:pPr lvl="1"/>
+            <a:r>
+              <a:rPr lang="en-US" dirty="0"/>
+              <a:t>Viz 3 – </a:t>
+            </a:r>
+            <a:r>
+              <a:rPr lang="en-US" dirty="0" err="1"/>
+              <a:t>treemap</a:t>
+            </a:r>
+            <a:endParaRPr lang="en-US" dirty="0"/>
+          </a:p>
+          <a:p>
+            <a:pPr lvl="1"/>
+            <a:r>
+              <a:rPr lang="en-US" dirty="0"/>
+              <a:t>Viz 4 - bar</a:t>
+            </a:r>
+          </a:p>
+          <a:p>
+            <a:r>
+              <a:rPr lang="en-US" dirty="0"/>
+              <a:t>Creating the MongoDB</a:t>
+            </a:r>
+          </a:p>
+          <a:p>
+            <a:r>
+              <a:rPr lang="en-US" dirty="0" err="1"/>
+              <a:t>Index.html</a:t>
+            </a:r>
+            <a:r>
+              <a:rPr lang="en-US" dirty="0"/>
+              <a:t> (homepage through Git Pages) </a:t>
+            </a:r>
+          </a:p>
+          <a:p>
+            <a:r>
+              <a:rPr lang="en-US" dirty="0" err="1"/>
+              <a:t>Index.html</a:t>
+            </a:r>
+            <a:r>
+              <a:rPr lang="en-US" dirty="0"/>
+              <a:t> (drill-down)</a:t>
+            </a:r>
+          </a:p>
+          <a:p>
+            <a:r>
+              <a:rPr lang="en-US" dirty="0" err="1"/>
+              <a:t>Index.html</a:t>
+            </a:r>
+            <a:r>
+              <a:rPr lang="en-US" dirty="0"/>
+              <a:t> (about)</a:t>
+            </a:r>
+          </a:p>
+          <a:p>
+            <a:r>
+              <a:rPr lang="en-US" dirty="0" err="1"/>
+              <a:t>Index.html</a:t>
+            </a:r>
+            <a:r>
+              <a:rPr lang="en-US" dirty="0"/>
+              <a:t> (team)</a:t>
+            </a:r>
+          </a:p>
+          <a:p>
+            <a:r>
+              <a:rPr lang="en-US" dirty="0" err="1"/>
+              <a:t>css</a:t>
+            </a:r>
+            <a:endParaRPr lang="en-US" dirty="0"/>
+          </a:p>
+        </p:txBody>
+      </p:sp>
+    </p:spTree>
+    <p:extLst>
+      <p:ext uri="{BB962C8B-B14F-4D97-AF65-F5344CB8AC3E}">
+        <p14:creationId xmlns:p14="http://schemas.microsoft.com/office/powerpoint/2010/main" val="3082688474"/>
+      </p:ext>
+    </p:extLst>
+  </p:cSld>
+  <p:clrMapOvr>
+    <a:masterClrMapping/>
+  </p:clrMapOvr>
+</p:sld>
+</file>
+
+<file path=ppt/slides/slide7.xml><?xml version="1.0" encoding="utf-8"?>
+<p:sld xmlns:a="http://schemas.openxmlformats.org/drawingml/2006/main" xmlns:r="http://schemas.openxmlformats.org/officeDocument/2006/relationships" xmlns:p="http://schemas.openxmlformats.org/presentationml/2006/main">
+  <p:cSld>
+    <p:spTree>
+      <p:nvGrpSpPr>
+        <p:cNvPr id="1" name=""/>
+        <p:cNvGrpSpPr/>
+        <p:nvPr/>
+      </p:nvGrpSpPr>
+      <p:grpSpPr>
+        <a:xfrm>
+          <a:off x="0" y="0"/>
+          <a:ext cx="0" cy="0"/>
+          <a:chOff x="0" y="0"/>
+          <a:chExt cx="0" cy="0"/>
+        </a:xfrm>
+      </p:grpSpPr>
+      <p:sp>
+        <p:nvSpPr>
+          <p:cNvPr id="2" name="Title 1">
+            <a:extLst>
+              <a:ext uri="{FF2B5EF4-FFF2-40B4-BE49-F238E27FC236}">
+                <a16:creationId xmlns:a16="http://schemas.microsoft.com/office/drawing/2014/main" id="{9102B7E5-7BA4-174E-9D29-291A9AC12178}"/>
+              </a:ext>
+            </a:extLst>
+          </p:cNvPr>
+          <p:cNvSpPr>
+            <a:spLocks noGrp="1"/>
+          </p:cNvSpPr>
+          <p:nvPr>
+            <p:ph type="title"/>
+          </p:nvPr>
+        </p:nvSpPr>
+        <p:spPr/>
+        <p:txBody>
+          <a:bodyPr/>
+          <a:lstStyle/>
+          <a:p>
+            <a:r>
+              <a:rPr lang="en-US" dirty="0"/>
+              <a:t>Workflow</a:t>
+            </a:r>
+          </a:p>
+        </p:txBody>
+      </p:sp>
+      <p:graphicFrame>
+        <p:nvGraphicFramePr>
+          <p:cNvPr id="4" name="Content Placeholder 3">
+            <a:extLst>
+              <a:ext uri="{FF2B5EF4-FFF2-40B4-BE49-F238E27FC236}">
+                <a16:creationId xmlns:a16="http://schemas.microsoft.com/office/drawing/2014/main" id="{8C36ABEF-59B6-8146-8EE5-D337084AA47F}"/>
+              </a:ext>
+            </a:extLst>
+          </p:cNvPr>
+          <p:cNvGraphicFramePr>
+            <a:graphicFrameLocks noGrp="1"/>
+          </p:cNvGraphicFramePr>
+          <p:nvPr>
+            <p:ph idx="1"/>
+            <p:extLst>
+              <p:ext uri="{D42A27DB-BD31-4B8C-83A1-F6EECF244321}">
+                <p14:modId xmlns:p14="http://schemas.microsoft.com/office/powerpoint/2010/main" val="3963167313"/>
+              </p:ext>
+            </p:extLst>
+          </p:nvPr>
+        </p:nvGraphicFramePr>
+        <p:xfrm>
+          <a:off x="838200" y="907426"/>
+          <a:ext cx="10515600" cy="2029683"/>
+        </p:xfrm>
+        <a:graphic>
+          <a:graphicData uri="http://schemas.openxmlformats.org/drawingml/2006/diagram">
+            <dgm:relIds xmlns:dgm="http://schemas.openxmlformats.org/drawingml/2006/diagram" xmlns:r="http://schemas.openxmlformats.org/officeDocument/2006/relationships" r:dm="rId2" r:lo="rId3" r:qs="rId4" r:cs="rId5"/>
+          </a:graphicData>
+        </a:graphic>
+      </p:graphicFrame>
+      <p:sp>
+        <p:nvSpPr>
+          <p:cNvPr id="5" name="TextBox 4">
+            <a:extLst>
+              <a:ext uri="{FF2B5EF4-FFF2-40B4-BE49-F238E27FC236}">
+                <a16:creationId xmlns:a16="http://schemas.microsoft.com/office/drawing/2014/main" id="{288B4B9C-99CC-8A4E-B8AF-9596CB1B7EC6}"/>
+              </a:ext>
+            </a:extLst>
+          </p:cNvPr>
+          <p:cNvSpPr txBox="1"/>
+          <p:nvPr/>
+        </p:nvSpPr>
+        <p:spPr>
+          <a:xfrm>
+            <a:off x="838200" y="2850612"/>
+            <a:ext cx="2192588" cy="646331"/>
+          </a:xfrm>
+          <a:prstGeom prst="rect">
+            <a:avLst/>
+          </a:prstGeom>
+          <a:noFill/>
+        </p:spPr>
+        <p:txBody>
+          <a:bodyPr wrap="none" rtlCol="0">
+            <a:spAutoFit/>
+          </a:bodyPr>
+          <a:lstStyle/>
+          <a:p>
+            <a:r>
+              <a:rPr lang="en-US" dirty="0"/>
+              <a:t>- Storing in MongoDB</a:t>
+            </a:r>
+          </a:p>
+          <a:p>
+            <a:r>
+              <a:rPr lang="en-US" dirty="0"/>
+              <a:t>     - Column labels</a:t>
+            </a:r>
+          </a:p>
+        </p:txBody>
+      </p:sp>
+      <p:sp>
+        <p:nvSpPr>
+          <p:cNvPr id="6" name="TextBox 5">
+            <a:extLst>
+              <a:ext uri="{FF2B5EF4-FFF2-40B4-BE49-F238E27FC236}">
+                <a16:creationId xmlns:a16="http://schemas.microsoft.com/office/drawing/2014/main" id="{E3DD05E3-2A5F-2245-AB35-2FACB3A36678}"/>
+              </a:ext>
+            </a:extLst>
+          </p:cNvPr>
+          <p:cNvSpPr txBox="1"/>
+          <p:nvPr/>
+        </p:nvSpPr>
+        <p:spPr>
+          <a:xfrm>
+            <a:off x="3684373" y="2900039"/>
+            <a:ext cx="1998176" cy="2031325"/>
+          </a:xfrm>
+          <a:prstGeom prst="rect">
+            <a:avLst/>
+          </a:prstGeom>
+          <a:noFill/>
+        </p:spPr>
+        <p:txBody>
+          <a:bodyPr wrap="none" rtlCol="0">
+            <a:spAutoFit/>
+          </a:bodyPr>
+          <a:lstStyle/>
+          <a:p>
+            <a:pPr marL="285750" indent="-285750">
+              <a:buFontTx/>
+              <a:buChar char="-"/>
+            </a:pPr>
+            <a:r>
+              <a:rPr lang="en-US" dirty="0"/>
+              <a:t>Flask </a:t>
+            </a:r>
+            <a:r>
+              <a:rPr lang="en-US" dirty="0" err="1"/>
+              <a:t>App.py</a:t>
+            </a:r>
+            <a:endParaRPr lang="en-US" dirty="0"/>
+          </a:p>
+          <a:p>
+            <a:pPr marL="742950" lvl="1" indent="-285750">
+              <a:buFontTx/>
+              <a:buChar char="-"/>
+            </a:pPr>
+            <a:r>
+              <a:rPr lang="en-US" dirty="0" err="1"/>
+              <a:t>Sqlalchemy</a:t>
+            </a:r>
+            <a:endParaRPr lang="en-US" dirty="0"/>
+          </a:p>
+          <a:p>
+            <a:pPr marL="742950" lvl="1" indent="-285750">
+              <a:buFontTx/>
+              <a:buChar char="-"/>
+            </a:pPr>
+            <a:endParaRPr lang="en-US" dirty="0"/>
+          </a:p>
+          <a:p>
+            <a:pPr marL="285750" indent="-285750">
+              <a:buFontTx/>
+              <a:buChar char="-"/>
+            </a:pPr>
+            <a:r>
+              <a:rPr lang="en-US" b="1" dirty="0"/>
+              <a:t>Routing</a:t>
+            </a:r>
+          </a:p>
+          <a:p>
+            <a:pPr marL="285750" indent="-285750">
+              <a:buFontTx/>
+              <a:buChar char="-"/>
+            </a:pPr>
+            <a:r>
+              <a:rPr lang="en-US" dirty="0"/>
+              <a:t>/  = homepage</a:t>
+            </a:r>
+          </a:p>
+          <a:p>
+            <a:pPr marL="285750" indent="-285750">
+              <a:buFontTx/>
+              <a:buChar char="-"/>
+            </a:pPr>
+            <a:r>
+              <a:rPr lang="en-US" dirty="0"/>
+              <a:t>/year/&lt;filter&gt; </a:t>
+            </a:r>
+          </a:p>
+          <a:p>
+            <a:pPr marL="742950" lvl="1" indent="-285750">
+              <a:buFontTx/>
+              <a:buChar char="-"/>
+            </a:pPr>
+            <a:endParaRPr lang="en-US" dirty="0"/>
+          </a:p>
+        </p:txBody>
+      </p:sp>
+      <p:sp>
+        <p:nvSpPr>
+          <p:cNvPr id="7" name="TextBox 6">
+            <a:extLst>
+              <a:ext uri="{FF2B5EF4-FFF2-40B4-BE49-F238E27FC236}">
+                <a16:creationId xmlns:a16="http://schemas.microsoft.com/office/drawing/2014/main" id="{38CA32D0-3030-A34F-92C7-0F5F3EDF5BBE}"/>
+              </a:ext>
+            </a:extLst>
+          </p:cNvPr>
+          <p:cNvSpPr txBox="1"/>
+          <p:nvPr/>
+        </p:nvSpPr>
+        <p:spPr>
+          <a:xfrm>
+            <a:off x="6530548" y="2887682"/>
+            <a:ext cx="2415744" cy="3970318"/>
+          </a:xfrm>
+          <a:prstGeom prst="rect">
+            <a:avLst/>
+          </a:prstGeom>
+          <a:noFill/>
+        </p:spPr>
+        <p:txBody>
+          <a:bodyPr wrap="square" rtlCol="0">
+            <a:spAutoFit/>
+          </a:bodyPr>
+          <a:lstStyle/>
+          <a:p>
+            <a:r>
+              <a:rPr lang="en-US" dirty="0"/>
+              <a:t>- Build and test outside of call</a:t>
+            </a:r>
+          </a:p>
+          <a:p>
+            <a:pPr marL="285750" indent="-285750">
+              <a:buFontTx/>
+              <a:buChar char="-"/>
+            </a:pPr>
+            <a:r>
+              <a:rPr lang="en-US" dirty="0"/>
+              <a:t>Integrate into API</a:t>
+            </a:r>
+          </a:p>
+          <a:p>
+            <a:pPr marL="285750" indent="-285750">
+              <a:buFontTx/>
+              <a:buChar char="-"/>
+            </a:pPr>
+            <a:r>
+              <a:rPr lang="en-US" dirty="0"/>
+              <a:t>New library?</a:t>
+            </a:r>
+          </a:p>
+          <a:p>
+            <a:endParaRPr lang="en-US" dirty="0"/>
+          </a:p>
+          <a:p>
+            <a:r>
+              <a:rPr lang="en-US" dirty="0" err="1"/>
+              <a:t>App.js</a:t>
+            </a:r>
+            <a:endParaRPr lang="en-US" dirty="0"/>
+          </a:p>
+          <a:p>
+            <a:pPr lvl="1"/>
+            <a:r>
+              <a:rPr lang="en-US" dirty="0"/>
+              <a:t>Viz 1 – map</a:t>
+            </a:r>
+          </a:p>
+          <a:p>
+            <a:pPr lvl="1"/>
+            <a:r>
+              <a:rPr lang="en-US" dirty="0"/>
+              <a:t>Viz 2 – chart : x axis = year, bars/y = disease, filtered by state</a:t>
+            </a:r>
+          </a:p>
+          <a:p>
+            <a:pPr lvl="1"/>
+            <a:r>
+              <a:rPr lang="en-US" dirty="0"/>
+              <a:t>Viz 3 – </a:t>
+            </a:r>
+            <a:r>
+              <a:rPr lang="en-US" dirty="0" err="1"/>
+              <a:t>treemap</a:t>
+            </a:r>
+            <a:r>
+              <a:rPr lang="en-US" dirty="0"/>
+              <a:t> (new library)</a:t>
+            </a:r>
+          </a:p>
+          <a:p>
+            <a:pPr lvl="1"/>
+            <a:r>
+              <a:rPr lang="en-US" dirty="0"/>
+              <a:t>Viz 4 - bar</a:t>
+            </a:r>
+          </a:p>
+        </p:txBody>
+      </p:sp>
+      <p:sp>
+        <p:nvSpPr>
+          <p:cNvPr id="8" name="TextBox 7">
+            <a:extLst>
+              <a:ext uri="{FF2B5EF4-FFF2-40B4-BE49-F238E27FC236}">
+                <a16:creationId xmlns:a16="http://schemas.microsoft.com/office/drawing/2014/main" id="{B5065E93-70F6-3A4D-92B8-73DF2ABDEE3F}"/>
+              </a:ext>
+            </a:extLst>
+          </p:cNvPr>
+          <p:cNvSpPr txBox="1"/>
+          <p:nvPr/>
+        </p:nvSpPr>
+        <p:spPr>
+          <a:xfrm>
+            <a:off x="9264849" y="2887682"/>
+            <a:ext cx="2415744" cy="2585323"/>
+          </a:xfrm>
+          <a:prstGeom prst="rect">
+            <a:avLst/>
+          </a:prstGeom>
+          <a:noFill/>
+        </p:spPr>
+        <p:txBody>
+          <a:bodyPr wrap="square" rtlCol="0">
+            <a:spAutoFit/>
+          </a:bodyPr>
+          <a:lstStyle/>
+          <a:p>
+            <a:pPr marL="285750" indent="-285750">
+              <a:buFontTx/>
+              <a:buChar char="-"/>
+            </a:pPr>
+            <a:r>
+              <a:rPr lang="en-US" dirty="0"/>
+              <a:t>HTML design</a:t>
+            </a:r>
+          </a:p>
+          <a:p>
+            <a:pPr marL="285750" indent="-285750">
+              <a:buFontTx/>
+              <a:buChar char="-"/>
+            </a:pPr>
+            <a:r>
+              <a:rPr lang="en-US" dirty="0"/>
+              <a:t>CSS</a:t>
+            </a:r>
+          </a:p>
+          <a:p>
+            <a:endParaRPr lang="en-US" dirty="0"/>
+          </a:p>
+          <a:p>
+            <a:r>
+              <a:rPr lang="en-US" dirty="0"/>
+              <a:t>Page 1: home </a:t>
+            </a:r>
+          </a:p>
+          <a:p>
+            <a:r>
+              <a:rPr lang="en-US" dirty="0"/>
+              <a:t>Page 2: drill</a:t>
+            </a:r>
+          </a:p>
+          <a:p>
+            <a:r>
+              <a:rPr lang="en-US" dirty="0"/>
+              <a:t>Page 3: about</a:t>
+            </a:r>
+          </a:p>
+          <a:p>
+            <a:r>
+              <a:rPr lang="en-US" dirty="0"/>
+              <a:t>Page 4: team</a:t>
+            </a:r>
+          </a:p>
+          <a:p>
+            <a:endParaRPr lang="en-US" dirty="0"/>
+          </a:p>
+          <a:p>
+            <a:r>
+              <a:rPr lang="en-US" dirty="0"/>
+              <a:t>- What app? Heroku? </a:t>
+            </a:r>
+          </a:p>
+        </p:txBody>
+      </p:sp>
+    </p:spTree>
+    <p:extLst>
+      <p:ext uri="{BB962C8B-B14F-4D97-AF65-F5344CB8AC3E}">
+        <p14:creationId xmlns:p14="http://schemas.microsoft.com/office/powerpoint/2010/main" val="3293636227"/>
+      </p:ext>
+    </p:extLst>
+  </p:cSld>
+  <p:clrMapOvr>
+    <a:masterClrMapping/>
+  </p:clrMapOvr>
+</p:sld>
+</file>
+
+<file path=ppt/slides/slide8.xml><?xml version="1.0" encoding="utf-8"?>
+<p:sld xmlns:a="http://schemas.openxmlformats.org/drawingml/2006/main" xmlns:r="http://schemas.openxmlformats.org/officeDocument/2006/relationships" xmlns:p="http://schemas.openxmlformats.org/presentationml/2006/main">
+  <p:cSld>
+    <p:spTree>
+      <p:nvGrpSpPr>
+        <p:cNvPr id="1" name=""/>
+        <p:cNvGrpSpPr/>
+        <p:nvPr/>
+      </p:nvGrpSpPr>
+      <p:grpSpPr>
+        <a:xfrm>
+          <a:off x="0" y="0"/>
+          <a:ext cx="0" cy="0"/>
+          <a:chOff x="0" y="0"/>
+          <a:chExt cx="0" cy="0"/>
+        </a:xfrm>
+      </p:grpSpPr>
+      <p:sp>
+        <p:nvSpPr>
+          <p:cNvPr id="2" name="Title 1">
+            <a:extLst>
+              <a:ext uri="{FF2B5EF4-FFF2-40B4-BE49-F238E27FC236}">
+                <a16:creationId xmlns:a16="http://schemas.microsoft.com/office/drawing/2014/main" id="{EAB82680-9854-8B4A-9508-EFBDE2BC2303}"/>
+              </a:ext>
+            </a:extLst>
+          </p:cNvPr>
+          <p:cNvSpPr>
+            <a:spLocks noGrp="1"/>
+          </p:cNvSpPr>
+          <p:nvPr>
+            <p:ph type="title"/>
+          </p:nvPr>
+        </p:nvSpPr>
+        <p:spPr/>
+        <p:txBody>
+          <a:bodyPr/>
+          <a:lstStyle/>
+          <a:p>
+            <a:r>
+              <a:rPr lang="en-US" dirty="0"/>
+              <a:t>Questions to answer</a:t>
+            </a:r>
+          </a:p>
+        </p:txBody>
+      </p:sp>
+      <p:sp>
+        <p:nvSpPr>
+          <p:cNvPr id="3" name="Content Placeholder 2">
+            <a:extLst>
+              <a:ext uri="{FF2B5EF4-FFF2-40B4-BE49-F238E27FC236}">
+                <a16:creationId xmlns:a16="http://schemas.microsoft.com/office/drawing/2014/main" id="{63698765-9160-D54C-A7EA-26C6D9FB165A}"/>
+              </a:ext>
+            </a:extLst>
+          </p:cNvPr>
+          <p:cNvSpPr>
+            <a:spLocks noGrp="1"/>
+          </p:cNvSpPr>
+          <p:nvPr>
+            <p:ph idx="1"/>
+          </p:nvPr>
+        </p:nvSpPr>
+        <p:spPr/>
+        <p:txBody>
+          <a:bodyPr>
+            <a:normAutofit fontScale="47500" lnSpcReduction="20000"/>
+          </a:bodyPr>
+          <a:lstStyle/>
+          <a:p>
+            <a:r>
+              <a:rPr lang="en-US" b="1" dirty="0"/>
+              <a:t>What type of database do we want to use?  </a:t>
+            </a:r>
+            <a:r>
+              <a:rPr lang="en-US" b="1" dirty="0">
+                <a:solidFill>
+                  <a:srgbClr val="FF0000"/>
+                </a:solidFill>
+              </a:rPr>
+              <a:t>-  John G</a:t>
+            </a:r>
+          </a:p>
+          <a:p>
+            <a:pPr lvl="1"/>
+            <a:r>
+              <a:rPr lang="en-US" dirty="0"/>
+              <a:t>Storing the JSON to </a:t>
+            </a:r>
+            <a:r>
+              <a:rPr lang="en-US" dirty="0" err="1"/>
+              <a:t>sqlite</a:t>
+            </a:r>
+            <a:r>
+              <a:rPr lang="en-US" dirty="0"/>
+              <a:t> and then to Heroku’s free Postgres?</a:t>
+            </a:r>
+          </a:p>
+          <a:p>
+            <a:pPr lvl="2"/>
+            <a:r>
+              <a:rPr lang="en-US" dirty="0"/>
+              <a:t>What doe this process look like and is there a better method?  </a:t>
+            </a:r>
+          </a:p>
+          <a:p>
+            <a:pPr lvl="1"/>
+            <a:r>
+              <a:rPr lang="en-US" dirty="0"/>
+              <a:t>How do we export data to the format we need? Python?</a:t>
+            </a:r>
+          </a:p>
+          <a:p>
+            <a:endParaRPr lang="en-US" b="1" dirty="0"/>
+          </a:p>
+          <a:p>
+            <a:r>
+              <a:rPr lang="en-US" b="1" dirty="0"/>
+              <a:t>How do we want to display the map filters? Choropleth look/feel? </a:t>
+            </a:r>
+            <a:r>
+              <a:rPr lang="en-US" b="1" dirty="0">
+                <a:solidFill>
+                  <a:srgbClr val="FF0000"/>
+                </a:solidFill>
+              </a:rPr>
+              <a:t>-  John C</a:t>
+            </a:r>
+            <a:endParaRPr lang="en-US" b="1" dirty="0"/>
+          </a:p>
+          <a:p>
+            <a:pPr lvl="1"/>
+            <a:r>
+              <a:rPr lang="en-US" dirty="0"/>
+              <a:t>One layer for each of the diseases</a:t>
+            </a:r>
+          </a:p>
+          <a:p>
+            <a:pPr lvl="1"/>
+            <a:r>
+              <a:rPr lang="en-US" dirty="0"/>
+              <a:t>One or many years</a:t>
+            </a:r>
+          </a:p>
+          <a:p>
+            <a:pPr marL="0" indent="0">
+              <a:buNone/>
+            </a:pPr>
+            <a:endParaRPr lang="en-US" dirty="0"/>
+          </a:p>
+          <a:p>
+            <a:r>
+              <a:rPr lang="en-US" b="1" dirty="0"/>
+              <a:t>For drill-down page: Can we use a flask route with 3 inputs? </a:t>
+            </a:r>
+            <a:r>
+              <a:rPr lang="en-US" b="1" dirty="0">
+                <a:solidFill>
+                  <a:srgbClr val="FF0000"/>
+                </a:solidFill>
+              </a:rPr>
+              <a:t>-  Jeff B</a:t>
+            </a:r>
+            <a:endParaRPr lang="en-US" b="1" dirty="0"/>
+          </a:p>
+          <a:p>
+            <a:pPr lvl="1"/>
+            <a:r>
+              <a:rPr lang="en-US" dirty="0"/>
+              <a:t>What goes in @</a:t>
+            </a:r>
+            <a:r>
+              <a:rPr lang="en-US" dirty="0" err="1"/>
+              <a:t>app.route</a:t>
+            </a:r>
+            <a:r>
+              <a:rPr lang="en-US" dirty="0"/>
+              <a:t>(“/”)</a:t>
+            </a:r>
+          </a:p>
+          <a:p>
+            <a:pPr lvl="1"/>
+            <a:r>
+              <a:rPr lang="en-US" dirty="0"/>
+              <a:t>Can we build @</a:t>
+            </a:r>
+            <a:r>
+              <a:rPr lang="en-US" dirty="0" err="1"/>
+              <a:t>app.route</a:t>
+            </a:r>
+            <a:r>
+              <a:rPr lang="en-US" dirty="0"/>
+              <a:t>(“/&lt;year&gt;/&lt;state&gt;/&lt;cause-o-death&gt;</a:t>
+            </a:r>
+          </a:p>
+          <a:p>
+            <a:pPr lvl="1"/>
+            <a:endParaRPr lang="en-US" dirty="0"/>
+          </a:p>
+          <a:p>
+            <a:r>
+              <a:rPr lang="en-US" b="1" dirty="0"/>
+              <a:t>What’s the most efficient </a:t>
+            </a:r>
+            <a:r>
+              <a:rPr lang="en-US" b="1" dirty="0" err="1"/>
+              <a:t>javascript</a:t>
+            </a:r>
+            <a:r>
+              <a:rPr lang="en-US" b="1" dirty="0"/>
+              <a:t> for managing filters in our drill-down table? </a:t>
+            </a:r>
+            <a:r>
+              <a:rPr lang="en-US" b="1" dirty="0">
+                <a:solidFill>
+                  <a:srgbClr val="FF0000"/>
+                </a:solidFill>
+              </a:rPr>
+              <a:t>-  Bill M</a:t>
+            </a:r>
+            <a:endParaRPr lang="en-US" b="1" dirty="0"/>
+          </a:p>
+          <a:p>
+            <a:pPr lvl="1"/>
+            <a:r>
+              <a:rPr lang="en-US" dirty="0"/>
+              <a:t>Dropdown rather than text search requiring Consistent keywords</a:t>
+            </a:r>
+          </a:p>
+          <a:p>
+            <a:pPr lvl="1"/>
+            <a:endParaRPr lang="en-US" dirty="0"/>
+          </a:p>
+          <a:p>
+            <a:r>
+              <a:rPr lang="en-US" b="1" dirty="0"/>
+              <a:t>How in the hell do we do this on Heroku? </a:t>
+            </a:r>
+            <a:r>
+              <a:rPr lang="en-US" b="1" dirty="0">
+                <a:solidFill>
+                  <a:srgbClr val="FF0000"/>
+                </a:solidFill>
+              </a:rPr>
+              <a:t>-  Luke W</a:t>
+            </a:r>
+          </a:p>
+          <a:p>
+            <a:endParaRPr lang="en-US" b="1" dirty="0">
+              <a:solidFill>
+                <a:srgbClr val="FF0000"/>
+              </a:solidFill>
+            </a:endParaRPr>
+          </a:p>
+          <a:p>
+            <a:r>
+              <a:rPr lang="en-US" b="1" dirty="0">
+                <a:solidFill>
+                  <a:srgbClr val="FF0000"/>
+                </a:solidFill>
+              </a:rPr>
+              <a:t>Rendering multiple web pages</a:t>
+            </a:r>
+            <a:endParaRPr lang="en-US" b="1" dirty="0"/>
+          </a:p>
+          <a:p>
+            <a:endParaRPr lang="en-US" b="1" dirty="0"/>
+          </a:p>
+        </p:txBody>
+      </p:sp>
+    </p:spTree>
+    <p:extLst>
+      <p:ext uri="{BB962C8B-B14F-4D97-AF65-F5344CB8AC3E}">
+        <p14:creationId xmlns:p14="http://schemas.microsoft.com/office/powerpoint/2010/main" val="2594266111"/>
       </p:ext>
     </p:extLst>
   </p:cSld>

</xml_diff>